<commit_message>
ajustes diversos e inclusao da grid de jogadores por evento
</commit_message>
<xml_diff>
--- a/Banda Mestra Ap1.pptx
+++ b/Banda Mestra Ap1.pptx
@@ -9,16 +9,21 @@
     <p:sldId id="257" r:id="rId3"/>
     <p:sldId id="258" r:id="rId4"/>
     <p:sldId id="271" r:id="rId5"/>
-    <p:sldId id="259" r:id="rId6"/>
-    <p:sldId id="260" r:id="rId7"/>
-    <p:sldId id="265" r:id="rId8"/>
-    <p:sldId id="267" r:id="rId9"/>
-    <p:sldId id="261" r:id="rId10"/>
-    <p:sldId id="262" r:id="rId11"/>
-    <p:sldId id="270" r:id="rId12"/>
-    <p:sldId id="263" r:id="rId13"/>
-    <p:sldId id="264" r:id="rId14"/>
-    <p:sldId id="266" r:id="rId15"/>
+    <p:sldId id="276" r:id="rId6"/>
+    <p:sldId id="259" r:id="rId7"/>
+    <p:sldId id="260" r:id="rId8"/>
+    <p:sldId id="265" r:id="rId9"/>
+    <p:sldId id="267" r:id="rId10"/>
+    <p:sldId id="261" r:id="rId11"/>
+    <p:sldId id="262" r:id="rId12"/>
+    <p:sldId id="270" r:id="rId13"/>
+    <p:sldId id="263" r:id="rId14"/>
+    <p:sldId id="272" r:id="rId15"/>
+    <p:sldId id="264" r:id="rId16"/>
+    <p:sldId id="273" r:id="rId17"/>
+    <p:sldId id="274" r:id="rId18"/>
+    <p:sldId id="266" r:id="rId19"/>
+    <p:sldId id="275" r:id="rId20"/>
   </p:sldIdLst>
   <p:sldSz cx="12192000" cy="6858000"/>
   <p:notesSz cx="6858000" cy="9144000"/>
@@ -272,7 +277,7 @@
           <a:p>
             <a:fld id="{C4244007-960D-47B6-8302-5DD1C1169868}" type="datetimeFigureOut">
               <a:rPr lang="pt-BR" smtClean="0"/>
-              <a:t>15/06/2020</a:t>
+              <a:t>18/06/2020</a:t>
             </a:fld>
             <a:endParaRPr lang="pt-BR"/>
           </a:p>
@@ -470,7 +475,7 @@
           <a:p>
             <a:fld id="{C4244007-960D-47B6-8302-5DD1C1169868}" type="datetimeFigureOut">
               <a:rPr lang="pt-BR" smtClean="0"/>
-              <a:t>15/06/2020</a:t>
+              <a:t>18/06/2020</a:t>
             </a:fld>
             <a:endParaRPr lang="pt-BR"/>
           </a:p>
@@ -678,7 +683,7 @@
           <a:p>
             <a:fld id="{C4244007-960D-47B6-8302-5DD1C1169868}" type="datetimeFigureOut">
               <a:rPr lang="pt-BR" smtClean="0"/>
-              <a:t>15/06/2020</a:t>
+              <a:t>18/06/2020</a:t>
             </a:fld>
             <a:endParaRPr lang="pt-BR"/>
           </a:p>
@@ -876,7 +881,7 @@
           <a:p>
             <a:fld id="{C4244007-960D-47B6-8302-5DD1C1169868}" type="datetimeFigureOut">
               <a:rPr lang="pt-BR" smtClean="0"/>
-              <a:t>15/06/2020</a:t>
+              <a:t>18/06/2020</a:t>
             </a:fld>
             <a:endParaRPr lang="pt-BR"/>
           </a:p>
@@ -1151,7 +1156,7 @@
           <a:p>
             <a:fld id="{C4244007-960D-47B6-8302-5DD1C1169868}" type="datetimeFigureOut">
               <a:rPr lang="pt-BR" smtClean="0"/>
-              <a:t>15/06/2020</a:t>
+              <a:t>18/06/2020</a:t>
             </a:fld>
             <a:endParaRPr lang="pt-BR"/>
           </a:p>
@@ -1416,7 +1421,7 @@
           <a:p>
             <a:fld id="{C4244007-960D-47B6-8302-5DD1C1169868}" type="datetimeFigureOut">
               <a:rPr lang="pt-BR" smtClean="0"/>
-              <a:t>15/06/2020</a:t>
+              <a:t>18/06/2020</a:t>
             </a:fld>
             <a:endParaRPr lang="pt-BR"/>
           </a:p>
@@ -1828,7 +1833,7 @@
           <a:p>
             <a:fld id="{C4244007-960D-47B6-8302-5DD1C1169868}" type="datetimeFigureOut">
               <a:rPr lang="pt-BR" smtClean="0"/>
-              <a:t>15/06/2020</a:t>
+              <a:t>18/06/2020</a:t>
             </a:fld>
             <a:endParaRPr lang="pt-BR"/>
           </a:p>
@@ -1969,7 +1974,7 @@
           <a:p>
             <a:fld id="{C4244007-960D-47B6-8302-5DD1C1169868}" type="datetimeFigureOut">
               <a:rPr lang="pt-BR" smtClean="0"/>
-              <a:t>15/06/2020</a:t>
+              <a:t>18/06/2020</a:t>
             </a:fld>
             <a:endParaRPr lang="pt-BR"/>
           </a:p>
@@ -2082,7 +2087,7 @@
           <a:p>
             <a:fld id="{C4244007-960D-47B6-8302-5DD1C1169868}" type="datetimeFigureOut">
               <a:rPr lang="pt-BR" smtClean="0"/>
-              <a:t>15/06/2020</a:t>
+              <a:t>18/06/2020</a:t>
             </a:fld>
             <a:endParaRPr lang="pt-BR"/>
           </a:p>
@@ -2393,7 +2398,7 @@
           <a:p>
             <a:fld id="{C4244007-960D-47B6-8302-5DD1C1169868}" type="datetimeFigureOut">
               <a:rPr lang="pt-BR" smtClean="0"/>
-              <a:t>15/06/2020</a:t>
+              <a:t>18/06/2020</a:t>
             </a:fld>
             <a:endParaRPr lang="pt-BR"/>
           </a:p>
@@ -2681,7 +2686,7 @@
           <a:p>
             <a:fld id="{C4244007-960D-47B6-8302-5DD1C1169868}" type="datetimeFigureOut">
               <a:rPr lang="pt-BR" smtClean="0"/>
-              <a:t>15/06/2020</a:t>
+              <a:t>18/06/2020</a:t>
             </a:fld>
             <a:endParaRPr lang="pt-BR"/>
           </a:p>
@@ -2922,7 +2927,7 @@
           <a:p>
             <a:fld id="{C4244007-960D-47B6-8302-5DD1C1169868}" type="datetimeFigureOut">
               <a:rPr lang="pt-BR" smtClean="0"/>
-              <a:t>15/06/2020</a:t>
+              <a:t>18/06/2020</a:t>
             </a:fld>
             <a:endParaRPr lang="pt-BR"/>
           </a:p>
@@ -3432,27 +3437,8 @@
                   <a:srgbClr val="008080"/>
                 </a:highlight>
               </a:rPr>
-              <a:t>Aplicativo de Busca, Gestão e Ranqueamento de Jogadores de </a:t>
-            </a:r>
-            <a:r>
-              <a:rPr lang="pt-BR" sz="4000" b="1" dirty="0" err="1">
-                <a:solidFill>
-                  <a:schemeClr val="bg1"/>
-                </a:solidFill>
-                <a:highlight>
-                  <a:srgbClr val="008080"/>
-                </a:highlight>
-              </a:rPr>
-              <a:t>Boardgames</a:t>
-            </a:r>
-            <a:endParaRPr lang="pt-BR" sz="4000" b="1" dirty="0">
-              <a:solidFill>
-                <a:schemeClr val="bg1"/>
-              </a:solidFill>
-              <a:highlight>
-                <a:srgbClr val="008080"/>
-              </a:highlight>
-            </a:endParaRPr>
+              <a:t>Aplicação para Busca, Gestão e Ranqueamento de Jogadores e Jogos de Mesa</a:t>
+            </a:r>
           </a:p>
         </p:txBody>
       </p:sp>
@@ -3470,236 +3456,6 @@
 </file>
 
 <file path=ppt/slides/slide10.xml><?xml version="1.0" encoding="utf-8"?>
-<p:sld xmlns:a="http://schemas.openxmlformats.org/drawingml/2006/main" xmlns:r="http://schemas.openxmlformats.org/officeDocument/2006/relationships" xmlns:p="http://schemas.openxmlformats.org/presentationml/2006/main">
-  <p:cSld>
-    <p:bg>
-      <p:bgPr>
-        <a:blipFill dpi="0" rotWithShape="1">
-          <a:blip r:embed="rId2">
-            <a:lum/>
-          </a:blip>
-          <a:srcRect/>
-          <a:stretch>
-            <a:fillRect t="-19000" b="-19000"/>
-          </a:stretch>
-        </a:blipFill>
-        <a:effectLst/>
-      </p:bgPr>
-    </p:bg>
-    <p:spTree>
-      <p:nvGrpSpPr>
-        <p:cNvPr id="1" name=""/>
-        <p:cNvGrpSpPr/>
-        <p:nvPr/>
-      </p:nvGrpSpPr>
-      <p:grpSpPr>
-        <a:xfrm>
-          <a:off x="0" y="0"/>
-          <a:ext cx="0" cy="0"/>
-          <a:chOff x="0" y="0"/>
-          <a:chExt cx="0" cy="0"/>
-        </a:xfrm>
-      </p:grpSpPr>
-      <p:sp>
-        <p:nvSpPr>
-          <p:cNvPr id="2" name="Título 1">
-            <a:extLst>
-              <a:ext uri="{FF2B5EF4-FFF2-40B4-BE49-F238E27FC236}">
-                <a16:creationId xmlns:a16="http://schemas.microsoft.com/office/drawing/2014/main" id="{F6E3C07C-D3E4-4BC5-AA9B-A6628BAF67E4}"/>
-              </a:ext>
-            </a:extLst>
-          </p:cNvPr>
-          <p:cNvSpPr>
-            <a:spLocks noGrp="1"/>
-          </p:cNvSpPr>
-          <p:nvPr>
-            <p:ph type="title"/>
-          </p:nvPr>
-        </p:nvSpPr>
-        <p:spPr/>
-        <p:txBody>
-          <a:bodyPr/>
-          <a:lstStyle/>
-          <a:p>
-            <a:pPr algn="ctr"/>
-            <a:r>
-              <a:rPr lang="pt-BR" b="1" dirty="0">
-                <a:solidFill>
-                  <a:schemeClr val="bg1"/>
-                </a:solidFill>
-                <a:highlight>
-                  <a:srgbClr val="008080"/>
-                </a:highlight>
-              </a:rPr>
-              <a:t>Diagrama de Classes</a:t>
-            </a:r>
-          </a:p>
-        </p:txBody>
-      </p:sp>
-      <p:pic>
-        <p:nvPicPr>
-          <p:cNvPr id="5" name="Espaço Reservado para Conteúdo 4">
-            <a:extLst>
-              <a:ext uri="{FF2B5EF4-FFF2-40B4-BE49-F238E27FC236}">
-                <a16:creationId xmlns:a16="http://schemas.microsoft.com/office/drawing/2014/main" id="{2025461D-B7A5-4F71-821A-BF68631BE0A7}"/>
-              </a:ext>
-            </a:extLst>
-          </p:cNvPr>
-          <p:cNvPicPr>
-            <a:picLocks noGrp="1" noChangeAspect="1"/>
-          </p:cNvPicPr>
-          <p:nvPr>
-            <p:ph idx="1"/>
-          </p:nvPr>
-        </p:nvPicPr>
-        <p:blipFill>
-          <a:blip r:embed="rId3">
-            <a:extLst>
-              <a:ext uri="{28A0092B-C50C-407E-A947-70E740481C1C}">
-                <a14:useLocalDpi xmlns:a14="http://schemas.microsoft.com/office/drawing/2010/main" val="0"/>
-              </a:ext>
-            </a:extLst>
-          </a:blip>
-          <a:stretch>
-            <a:fillRect/>
-          </a:stretch>
-        </p:blipFill>
-        <p:spPr>
-          <a:xfrm>
-            <a:off x="1197634" y="2124222"/>
-            <a:ext cx="9796732" cy="3934326"/>
-          </a:xfrm>
-        </p:spPr>
-      </p:pic>
-    </p:spTree>
-    <p:extLst>
-      <p:ext uri="{BB962C8B-B14F-4D97-AF65-F5344CB8AC3E}">
-        <p14:creationId xmlns:p14="http://schemas.microsoft.com/office/powerpoint/2010/main" val="2016309364"/>
-      </p:ext>
-    </p:extLst>
-  </p:cSld>
-  <p:clrMapOvr>
-    <a:masterClrMapping/>
-  </p:clrMapOvr>
-</p:sld>
-</file>
-
-<file path=ppt/slides/slide11.xml><?xml version="1.0" encoding="utf-8"?>
-<p:sld xmlns:a="http://schemas.openxmlformats.org/drawingml/2006/main" xmlns:r="http://schemas.openxmlformats.org/officeDocument/2006/relationships" xmlns:p="http://schemas.openxmlformats.org/presentationml/2006/main">
-  <p:cSld>
-    <p:bg>
-      <p:bgPr>
-        <a:blipFill dpi="0" rotWithShape="1">
-          <a:blip r:embed="rId2">
-            <a:lum/>
-          </a:blip>
-          <a:srcRect/>
-          <a:stretch>
-            <a:fillRect t="-9000" b="-9000"/>
-          </a:stretch>
-        </a:blipFill>
-        <a:effectLst/>
-      </p:bgPr>
-    </p:bg>
-    <p:spTree>
-      <p:nvGrpSpPr>
-        <p:cNvPr id="1" name=""/>
-        <p:cNvGrpSpPr/>
-        <p:nvPr/>
-      </p:nvGrpSpPr>
-      <p:grpSpPr>
-        <a:xfrm>
-          <a:off x="0" y="0"/>
-          <a:ext cx="0" cy="0"/>
-          <a:chOff x="0" y="0"/>
-          <a:chExt cx="0" cy="0"/>
-        </a:xfrm>
-      </p:grpSpPr>
-      <p:sp>
-        <p:nvSpPr>
-          <p:cNvPr id="2" name="Título 1">
-            <a:extLst>
-              <a:ext uri="{FF2B5EF4-FFF2-40B4-BE49-F238E27FC236}">
-                <a16:creationId xmlns:a16="http://schemas.microsoft.com/office/drawing/2014/main" id="{4C7F59E9-5C40-475C-9EAC-1B591AD4F6B5}"/>
-              </a:ext>
-            </a:extLst>
-          </p:cNvPr>
-          <p:cNvSpPr>
-            <a:spLocks noGrp="1"/>
-          </p:cNvSpPr>
-          <p:nvPr>
-            <p:ph type="title"/>
-          </p:nvPr>
-        </p:nvSpPr>
-        <p:spPr/>
-        <p:txBody>
-          <a:bodyPr/>
-          <a:lstStyle/>
-          <a:p>
-            <a:pPr algn="ctr"/>
-            <a:r>
-              <a:rPr lang="pt-BR" b="1" dirty="0">
-                <a:solidFill>
-                  <a:schemeClr val="bg1"/>
-                </a:solidFill>
-                <a:highlight>
-                  <a:srgbClr val="008080"/>
-                </a:highlight>
-              </a:rPr>
-              <a:t>Diagrama de Casos de Uso</a:t>
-            </a:r>
-          </a:p>
-        </p:txBody>
-      </p:sp>
-      <p:pic>
-        <p:nvPicPr>
-          <p:cNvPr id="5" name="Espaço Reservado para Conteúdo 4">
-            <a:extLst>
-              <a:ext uri="{FF2B5EF4-FFF2-40B4-BE49-F238E27FC236}">
-                <a16:creationId xmlns:a16="http://schemas.microsoft.com/office/drawing/2014/main" id="{6A2A6E5C-53B9-4A06-8383-2F9889ECCE12}"/>
-              </a:ext>
-            </a:extLst>
-          </p:cNvPr>
-          <p:cNvPicPr>
-            <a:picLocks noGrp="1" noChangeAspect="1"/>
-          </p:cNvPicPr>
-          <p:nvPr>
-            <p:ph idx="1"/>
-          </p:nvPr>
-        </p:nvPicPr>
-        <p:blipFill>
-          <a:blip r:embed="rId3">
-            <a:extLst>
-              <a:ext uri="{28A0092B-C50C-407E-A947-70E740481C1C}">
-                <a14:useLocalDpi xmlns:a14="http://schemas.microsoft.com/office/drawing/2010/main" val="0"/>
-              </a:ext>
-            </a:extLst>
-          </a:blip>
-          <a:stretch>
-            <a:fillRect/>
-          </a:stretch>
-        </p:blipFill>
-        <p:spPr>
-          <a:xfrm>
-            <a:off x="2306782" y="1459835"/>
-            <a:ext cx="7578436" cy="5033040"/>
-          </a:xfrm>
-        </p:spPr>
-      </p:pic>
-    </p:spTree>
-    <p:extLst>
-      <p:ext uri="{BB962C8B-B14F-4D97-AF65-F5344CB8AC3E}">
-        <p14:creationId xmlns:p14="http://schemas.microsoft.com/office/powerpoint/2010/main" val="2419701383"/>
-      </p:ext>
-    </p:extLst>
-  </p:cSld>
-  <p:clrMapOvr>
-    <a:masterClrMapping/>
-  </p:clrMapOvr>
-</p:sld>
-</file>
-
-<file path=ppt/slides/slide12.xml><?xml version="1.0" encoding="utf-8"?>
 <p:sld xmlns:a="http://schemas.openxmlformats.org/drawingml/2006/main" xmlns:r="http://schemas.openxmlformats.org/officeDocument/2006/relationships" xmlns:p="http://schemas.openxmlformats.org/presentationml/2006/main">
   <p:cSld>
     <p:bg>
@@ -3755,7 +3511,7 @@
           <p:cNvPr id="2" name="Título 1">
             <a:extLst>
               <a:ext uri="{FF2B5EF4-FFF2-40B4-BE49-F238E27FC236}">
-                <a16:creationId xmlns:a16="http://schemas.microsoft.com/office/drawing/2014/main" id="{052619FD-3414-41B9-AE42-3F75CF3CE308}"/>
+                <a16:creationId xmlns:a16="http://schemas.microsoft.com/office/drawing/2014/main" id="{1DFB1709-06AC-43E1-AC4A-E6FCA1645AF3}"/>
               </a:ext>
             </a:extLst>
           </p:cNvPr>
@@ -3773,18 +3529,26 @@
           <a:p>
             <a:pPr algn="ctr"/>
             <a:r>
-              <a:rPr lang="pt-BR" dirty="0"/>
-              <a:t>Progresso do Desenvolvimento</a:t>
+              <a:rPr lang="pt-BR" b="1" dirty="0"/>
+              <a:t>Fluxograma – </a:t>
+            </a:r>
+            <a:r>
+              <a:rPr lang="pt-BR" b="1" dirty="0" err="1"/>
+              <a:t>Javascript</a:t>
+            </a:r>
+            <a:r>
+              <a:rPr lang="pt-BR" b="1" dirty="0"/>
+              <a:t> do Começo ao Fim</a:t>
             </a:r>
           </a:p>
         </p:txBody>
       </p:sp>
       <p:pic>
         <p:nvPicPr>
-          <p:cNvPr id="5" name="Espaço Reservado para Conteúdo 4">
-            <a:extLst>
-              <a:ext uri="{FF2B5EF4-FFF2-40B4-BE49-F238E27FC236}">
-                <a16:creationId xmlns:a16="http://schemas.microsoft.com/office/drawing/2014/main" id="{4B839643-0AD1-4BD7-8A95-3BF397814882}"/>
+          <p:cNvPr id="11" name="Espaço Reservado para Conteúdo 10">
+            <a:extLst>
+              <a:ext uri="{FF2B5EF4-FFF2-40B4-BE49-F238E27FC236}">
+                <a16:creationId xmlns:a16="http://schemas.microsoft.com/office/drawing/2014/main" id="{57E10085-B4E6-4FE4-8EBE-3A2073243580}"/>
               </a:ext>
             </a:extLst>
           </p:cNvPr>
@@ -3809,15 +3573,247 @@
         </p:blipFill>
         <p:spPr>
           <a:xfrm>
-            <a:off x="1209823" y="1690688"/>
-            <a:ext cx="9994680" cy="4725077"/>
+            <a:off x="1487432" y="1873568"/>
+            <a:ext cx="9217136" cy="4189607"/>
           </a:xfrm>
         </p:spPr>
       </p:pic>
     </p:spTree>
     <p:extLst>
       <p:ext uri="{BB962C8B-B14F-4D97-AF65-F5344CB8AC3E}">
-        <p14:creationId xmlns:p14="http://schemas.microsoft.com/office/powerpoint/2010/main" val="3581781927"/>
+        <p14:creationId xmlns:p14="http://schemas.microsoft.com/office/powerpoint/2010/main" val="1646816897"/>
+      </p:ext>
+    </p:extLst>
+  </p:cSld>
+  <p:clrMapOvr>
+    <a:masterClrMapping/>
+  </p:clrMapOvr>
+</p:sld>
+</file>
+
+<file path=ppt/slides/slide11.xml><?xml version="1.0" encoding="utf-8"?>
+<p:sld xmlns:a="http://schemas.openxmlformats.org/drawingml/2006/main" xmlns:r="http://schemas.openxmlformats.org/officeDocument/2006/relationships" xmlns:p="http://schemas.openxmlformats.org/presentationml/2006/main">
+  <p:cSld>
+    <p:bg>
+      <p:bgPr>
+        <a:blipFill dpi="0" rotWithShape="1">
+          <a:blip r:embed="rId2">
+            <a:lum/>
+          </a:blip>
+          <a:srcRect/>
+          <a:stretch>
+            <a:fillRect t="-39000" b="-39000"/>
+          </a:stretch>
+        </a:blipFill>
+        <a:effectLst/>
+      </p:bgPr>
+    </p:bg>
+    <p:spTree>
+      <p:nvGrpSpPr>
+        <p:cNvPr id="1" name=""/>
+        <p:cNvGrpSpPr/>
+        <p:nvPr/>
+      </p:nvGrpSpPr>
+      <p:grpSpPr>
+        <a:xfrm>
+          <a:off x="0" y="0"/>
+          <a:ext cx="0" cy="0"/>
+          <a:chOff x="0" y="0"/>
+          <a:chExt cx="0" cy="0"/>
+        </a:xfrm>
+      </p:grpSpPr>
+      <p:sp>
+        <p:nvSpPr>
+          <p:cNvPr id="2" name="Título 1">
+            <a:extLst>
+              <a:ext uri="{FF2B5EF4-FFF2-40B4-BE49-F238E27FC236}">
+                <a16:creationId xmlns:a16="http://schemas.microsoft.com/office/drawing/2014/main" id="{F6E3C07C-D3E4-4BC5-AA9B-A6628BAF67E4}"/>
+              </a:ext>
+            </a:extLst>
+          </p:cNvPr>
+          <p:cNvSpPr>
+            <a:spLocks noGrp="1"/>
+          </p:cNvSpPr>
+          <p:nvPr>
+            <p:ph type="title"/>
+          </p:nvPr>
+        </p:nvSpPr>
+        <p:spPr>
+          <a:xfrm>
+            <a:off x="838199" y="252583"/>
+            <a:ext cx="10515600" cy="1325563"/>
+          </a:xfrm>
+        </p:spPr>
+        <p:txBody>
+          <a:bodyPr>
+            <a:normAutofit/>
+          </a:bodyPr>
+          <a:lstStyle/>
+          <a:p>
+            <a:pPr algn="ctr"/>
+            <a:r>
+              <a:rPr lang="pt-BR" sz="6000" b="1" dirty="0">
+                <a:solidFill>
+                  <a:srgbClr val="FFC000"/>
+                </a:solidFill>
+              </a:rPr>
+              <a:t>Diagrama de Classes</a:t>
+            </a:r>
+          </a:p>
+        </p:txBody>
+      </p:sp>
+      <p:pic>
+        <p:nvPicPr>
+          <p:cNvPr id="5" name="Espaço Reservado para Conteúdo 4">
+            <a:extLst>
+              <a:ext uri="{FF2B5EF4-FFF2-40B4-BE49-F238E27FC236}">
+                <a16:creationId xmlns:a16="http://schemas.microsoft.com/office/drawing/2014/main" id="{2025461D-B7A5-4F71-821A-BF68631BE0A7}"/>
+              </a:ext>
+            </a:extLst>
+          </p:cNvPr>
+          <p:cNvPicPr>
+            <a:picLocks noGrp="1" noChangeAspect="1"/>
+          </p:cNvPicPr>
+          <p:nvPr>
+            <p:ph idx="1"/>
+          </p:nvPr>
+        </p:nvPicPr>
+        <p:blipFill>
+          <a:blip r:embed="rId3">
+            <a:extLst>
+              <a:ext uri="{28A0092B-C50C-407E-A947-70E740481C1C}">
+                <a14:useLocalDpi xmlns:a14="http://schemas.microsoft.com/office/drawing/2010/main" val="0"/>
+              </a:ext>
+            </a:extLst>
+          </a:blip>
+          <a:srcRect/>
+          <a:stretch/>
+        </p:blipFill>
+        <p:spPr>
+          <a:xfrm>
+            <a:off x="1506570" y="1403002"/>
+            <a:ext cx="9178859" cy="5089873"/>
+          </a:xfrm>
+        </p:spPr>
+      </p:pic>
+    </p:spTree>
+    <p:extLst>
+      <p:ext uri="{BB962C8B-B14F-4D97-AF65-F5344CB8AC3E}">
+        <p14:creationId xmlns:p14="http://schemas.microsoft.com/office/powerpoint/2010/main" val="2016309364"/>
+      </p:ext>
+    </p:extLst>
+  </p:cSld>
+  <p:clrMapOvr>
+    <a:masterClrMapping/>
+  </p:clrMapOvr>
+</p:sld>
+</file>
+
+<file path=ppt/slides/slide12.xml><?xml version="1.0" encoding="utf-8"?>
+<p:sld xmlns:a="http://schemas.openxmlformats.org/drawingml/2006/main" xmlns:r="http://schemas.openxmlformats.org/officeDocument/2006/relationships" xmlns:p="http://schemas.openxmlformats.org/presentationml/2006/main">
+  <p:cSld>
+    <p:bg>
+      <p:bgPr>
+        <a:blipFill dpi="0" rotWithShape="1">
+          <a:blip r:embed="rId2">
+            <a:lum/>
+          </a:blip>
+          <a:srcRect/>
+          <a:stretch>
+            <a:fillRect t="-9000" b="-9000"/>
+          </a:stretch>
+        </a:blipFill>
+        <a:effectLst/>
+      </p:bgPr>
+    </p:bg>
+    <p:spTree>
+      <p:nvGrpSpPr>
+        <p:cNvPr id="1" name=""/>
+        <p:cNvGrpSpPr/>
+        <p:nvPr/>
+      </p:nvGrpSpPr>
+      <p:grpSpPr>
+        <a:xfrm>
+          <a:off x="0" y="0"/>
+          <a:ext cx="0" cy="0"/>
+          <a:chOff x="0" y="0"/>
+          <a:chExt cx="0" cy="0"/>
+        </a:xfrm>
+      </p:grpSpPr>
+      <p:sp>
+        <p:nvSpPr>
+          <p:cNvPr id="2" name="Título 1">
+            <a:extLst>
+              <a:ext uri="{FF2B5EF4-FFF2-40B4-BE49-F238E27FC236}">
+                <a16:creationId xmlns:a16="http://schemas.microsoft.com/office/drawing/2014/main" id="{4C7F59E9-5C40-475C-9EAC-1B591AD4F6B5}"/>
+              </a:ext>
+            </a:extLst>
+          </p:cNvPr>
+          <p:cNvSpPr>
+            <a:spLocks noGrp="1"/>
+          </p:cNvSpPr>
+          <p:nvPr>
+            <p:ph type="title"/>
+          </p:nvPr>
+        </p:nvSpPr>
+        <p:spPr/>
+        <p:txBody>
+          <a:bodyPr/>
+          <a:lstStyle/>
+          <a:p>
+            <a:pPr algn="ctr"/>
+            <a:r>
+              <a:rPr lang="pt-BR" b="1" dirty="0">
+                <a:solidFill>
+                  <a:schemeClr val="bg1"/>
+                </a:solidFill>
+                <a:highlight>
+                  <a:srgbClr val="008080"/>
+                </a:highlight>
+              </a:rPr>
+              <a:t>Diagrama de Casos de Uso</a:t>
+            </a:r>
+          </a:p>
+        </p:txBody>
+      </p:sp>
+      <p:pic>
+        <p:nvPicPr>
+          <p:cNvPr id="5" name="Espaço Reservado para Conteúdo 4">
+            <a:extLst>
+              <a:ext uri="{FF2B5EF4-FFF2-40B4-BE49-F238E27FC236}">
+                <a16:creationId xmlns:a16="http://schemas.microsoft.com/office/drawing/2014/main" id="{6A2A6E5C-53B9-4A06-8383-2F9889ECCE12}"/>
+              </a:ext>
+            </a:extLst>
+          </p:cNvPr>
+          <p:cNvPicPr>
+            <a:picLocks noGrp="1" noChangeAspect="1"/>
+          </p:cNvPicPr>
+          <p:nvPr>
+            <p:ph idx="1"/>
+          </p:nvPr>
+        </p:nvPicPr>
+        <p:blipFill>
+          <a:blip r:embed="rId3">
+            <a:extLst>
+              <a:ext uri="{28A0092B-C50C-407E-A947-70E740481C1C}">
+                <a14:useLocalDpi xmlns:a14="http://schemas.microsoft.com/office/drawing/2010/main" val="0"/>
+              </a:ext>
+            </a:extLst>
+          </a:blip>
+          <a:srcRect/>
+          <a:stretch/>
+        </p:blipFill>
+        <p:spPr>
+          <a:xfrm>
+            <a:off x="1537252" y="1459835"/>
+            <a:ext cx="8931965" cy="5033040"/>
+          </a:xfrm>
+        </p:spPr>
+      </p:pic>
+    </p:spTree>
+    <p:extLst>
+      <p:ext uri="{BB962C8B-B14F-4D97-AF65-F5344CB8AC3E}">
+        <p14:creationId xmlns:p14="http://schemas.microsoft.com/office/powerpoint/2010/main" val="2419701383"/>
       </p:ext>
     </p:extLst>
   </p:cSld>
@@ -3883,7 +3879,7 @@
           <p:cNvPr id="2" name="Título 1">
             <a:extLst>
               <a:ext uri="{FF2B5EF4-FFF2-40B4-BE49-F238E27FC236}">
-                <a16:creationId xmlns:a16="http://schemas.microsoft.com/office/drawing/2014/main" id="{4C18766B-B762-4574-A6C0-470650F3D31C}"/>
+                <a16:creationId xmlns:a16="http://schemas.microsoft.com/office/drawing/2014/main" id="{052619FD-3414-41B9-AE42-3F75CF3CE308}"/>
               </a:ext>
             </a:extLst>
           </p:cNvPr>
@@ -3901,125 +3897,51 @@
           <a:p>
             <a:pPr algn="ctr"/>
             <a:r>
-              <a:rPr lang="pt-BR" dirty="0"/>
-              <a:t>O que falta ser feito ?</a:t>
-            </a:r>
-          </a:p>
-        </p:txBody>
-      </p:sp>
-      <p:sp>
-        <p:nvSpPr>
-          <p:cNvPr id="3" name="Espaço Reservado para Conteúdo 2">
-            <a:extLst>
-              <a:ext uri="{FF2B5EF4-FFF2-40B4-BE49-F238E27FC236}">
-                <a16:creationId xmlns:a16="http://schemas.microsoft.com/office/drawing/2014/main" id="{94B54B5C-F2B9-4B6D-A2B3-513375728583}"/>
-              </a:ext>
-            </a:extLst>
-          </p:cNvPr>
-          <p:cNvSpPr>
-            <a:spLocks noGrp="1"/>
-          </p:cNvSpPr>
+              <a:rPr lang="pt-BR" b="1" dirty="0"/>
+              <a:t>Desenvolvimento: O começo</a:t>
+            </a:r>
+          </a:p>
+        </p:txBody>
+      </p:sp>
+      <p:pic>
+        <p:nvPicPr>
+          <p:cNvPr id="5" name="Espaço Reservado para Conteúdo 4">
+            <a:extLst>
+              <a:ext uri="{FF2B5EF4-FFF2-40B4-BE49-F238E27FC236}">
+                <a16:creationId xmlns:a16="http://schemas.microsoft.com/office/drawing/2014/main" id="{4B839643-0AD1-4BD7-8A95-3BF397814882}"/>
+              </a:ext>
+            </a:extLst>
+          </p:cNvPr>
+          <p:cNvPicPr>
+            <a:picLocks noGrp="1" noChangeAspect="1"/>
+          </p:cNvPicPr>
           <p:nvPr>
             <p:ph idx="1"/>
           </p:nvPr>
-        </p:nvSpPr>
+        </p:nvPicPr>
+        <p:blipFill>
+          <a:blip r:embed="rId2">
+            <a:extLst>
+              <a:ext uri="{28A0092B-C50C-407E-A947-70E740481C1C}">
+                <a14:useLocalDpi xmlns:a14="http://schemas.microsoft.com/office/drawing/2010/main" val="0"/>
+              </a:ext>
+            </a:extLst>
+          </a:blip>
+          <a:stretch>
+            <a:fillRect/>
+          </a:stretch>
+        </p:blipFill>
         <p:spPr>
           <a:xfrm>
-            <a:off x="838200" y="2141537"/>
-            <a:ext cx="10515600" cy="4351338"/>
+            <a:off x="1209823" y="1690688"/>
+            <a:ext cx="9994680" cy="4725077"/>
           </a:xfrm>
         </p:spPr>
-        <p:txBody>
-          <a:bodyPr/>
-          <a:lstStyle/>
-          <a:p>
-            <a:r>
-              <a:rPr lang="pt-BR" dirty="0"/>
-              <a:t>Tela de login (front-</a:t>
-            </a:r>
-            <a:r>
-              <a:rPr lang="pt-BR" dirty="0" err="1"/>
-              <a:t>end</a:t>
-            </a:r>
-            <a:r>
-              <a:rPr lang="pt-BR" dirty="0"/>
-              <a:t>)</a:t>
-            </a:r>
-          </a:p>
-          <a:p>
-            <a:r>
-              <a:rPr lang="pt-BR" dirty="0"/>
-              <a:t>Tela de busca de jogadores (front-</a:t>
-            </a:r>
-            <a:r>
-              <a:rPr lang="pt-BR" dirty="0" err="1"/>
-              <a:t>end</a:t>
-            </a:r>
-            <a:r>
-              <a:rPr lang="pt-BR" dirty="0"/>
-              <a:t>)</a:t>
-            </a:r>
-          </a:p>
-          <a:p>
-            <a:r>
-              <a:rPr lang="pt-BR" dirty="0"/>
-              <a:t>Dashboard de eventos (front-</a:t>
-            </a:r>
-            <a:r>
-              <a:rPr lang="pt-BR" dirty="0" err="1"/>
-              <a:t>end</a:t>
-            </a:r>
-            <a:r>
-              <a:rPr lang="pt-BR" dirty="0"/>
-              <a:t>)</a:t>
-            </a:r>
-          </a:p>
-          <a:p>
-            <a:r>
-              <a:rPr lang="pt-BR" dirty="0"/>
-              <a:t>Método de verificação de documento (</a:t>
-            </a:r>
-            <a:r>
-              <a:rPr lang="pt-BR" dirty="0" err="1"/>
-              <a:t>api</a:t>
-            </a:r>
-            <a:r>
-              <a:rPr lang="pt-BR" dirty="0"/>
-              <a:t>)</a:t>
-            </a:r>
-          </a:p>
-          <a:p>
-            <a:r>
-              <a:rPr lang="pt-BR" dirty="0"/>
-              <a:t>Cálculo de ranqueamento de jogadores (</a:t>
-            </a:r>
-            <a:r>
-              <a:rPr lang="pt-BR" dirty="0" err="1"/>
-              <a:t>api</a:t>
-            </a:r>
-            <a:r>
-              <a:rPr lang="pt-BR" dirty="0"/>
-              <a:t>)</a:t>
-            </a:r>
-          </a:p>
-          <a:p>
-            <a:r>
-              <a:rPr lang="pt-BR" dirty="0"/>
-              <a:t>Criação do aplicativo mobile (mobile)</a:t>
-            </a:r>
-          </a:p>
-          <a:p>
-            <a:r>
-              <a:rPr lang="pt-BR" dirty="0"/>
-              <a:t>Testes de usabilidade (mobile)</a:t>
-            </a:r>
-          </a:p>
-        </p:txBody>
-      </p:sp>
+      </p:pic>
     </p:spTree>
     <p:extLst>
       <p:ext uri="{BB962C8B-B14F-4D97-AF65-F5344CB8AC3E}">
-        <p14:creationId xmlns:p14="http://schemas.microsoft.com/office/powerpoint/2010/main" val="2352215143"/>
+        <p14:creationId xmlns:p14="http://schemas.microsoft.com/office/powerpoint/2010/main" val="3581781927"/>
       </p:ext>
     </p:extLst>
   </p:cSld>
@@ -4085,6 +4007,756 @@
           <p:cNvPr id="2" name="Título 1">
             <a:extLst>
               <a:ext uri="{FF2B5EF4-FFF2-40B4-BE49-F238E27FC236}">
+                <a16:creationId xmlns:a16="http://schemas.microsoft.com/office/drawing/2014/main" id="{052619FD-3414-41B9-AE42-3F75CF3CE308}"/>
+              </a:ext>
+            </a:extLst>
+          </p:cNvPr>
+          <p:cNvSpPr>
+            <a:spLocks noGrp="1"/>
+          </p:cNvSpPr>
+          <p:nvPr>
+            <p:ph type="title"/>
+          </p:nvPr>
+        </p:nvSpPr>
+        <p:spPr/>
+        <p:txBody>
+          <a:bodyPr/>
+          <a:lstStyle/>
+          <a:p>
+            <a:pPr algn="ctr"/>
+            <a:r>
+              <a:rPr lang="pt-BR" b="1" dirty="0"/>
+              <a:t>Desenvolvimento: O Fim (será?)</a:t>
+            </a:r>
+          </a:p>
+        </p:txBody>
+      </p:sp>
+      <p:pic>
+        <p:nvPicPr>
+          <p:cNvPr id="7" name="Espaço Reservado para Conteúdo 6">
+            <a:extLst>
+              <a:ext uri="{FF2B5EF4-FFF2-40B4-BE49-F238E27FC236}">
+                <a16:creationId xmlns:a16="http://schemas.microsoft.com/office/drawing/2014/main" id="{3C492C11-9EC0-4BEB-A200-DD1C7E59E8CD}"/>
+              </a:ext>
+            </a:extLst>
+          </p:cNvPr>
+          <p:cNvPicPr>
+            <a:picLocks noGrp="1" noChangeAspect="1"/>
+          </p:cNvPicPr>
+          <p:nvPr>
+            <p:ph idx="1"/>
+          </p:nvPr>
+        </p:nvPicPr>
+        <p:blipFill>
+          <a:blip r:embed="rId2">
+            <a:extLst>
+              <a:ext uri="{28A0092B-C50C-407E-A947-70E740481C1C}">
+                <a14:useLocalDpi xmlns:a14="http://schemas.microsoft.com/office/drawing/2010/main" val="0"/>
+              </a:ext>
+            </a:extLst>
+          </a:blip>
+          <a:stretch>
+            <a:fillRect/>
+          </a:stretch>
+        </p:blipFill>
+        <p:spPr>
+          <a:xfrm>
+            <a:off x="1697569" y="1825625"/>
+            <a:ext cx="8796861" cy="4351338"/>
+          </a:xfrm>
+        </p:spPr>
+      </p:pic>
+    </p:spTree>
+    <p:extLst>
+      <p:ext uri="{BB962C8B-B14F-4D97-AF65-F5344CB8AC3E}">
+        <p14:creationId xmlns:p14="http://schemas.microsoft.com/office/powerpoint/2010/main" val="1905876348"/>
+      </p:ext>
+    </p:extLst>
+  </p:cSld>
+  <p:clrMapOvr>
+    <a:masterClrMapping/>
+  </p:clrMapOvr>
+</p:sld>
+</file>
+
+<file path=ppt/slides/slide15.xml><?xml version="1.0" encoding="utf-8"?>
+<p:sld xmlns:a="http://schemas.openxmlformats.org/drawingml/2006/main" xmlns:r="http://schemas.openxmlformats.org/officeDocument/2006/relationships" xmlns:p="http://schemas.openxmlformats.org/presentationml/2006/main">
+  <p:cSld>
+    <p:bg>
+      <p:bgPr>
+        <a:gradFill>
+          <a:gsLst>
+            <a:gs pos="0">
+              <a:schemeClr val="accent1">
+                <a:lumMod val="5000"/>
+                <a:lumOff val="95000"/>
+              </a:schemeClr>
+            </a:gs>
+            <a:gs pos="74000">
+              <a:schemeClr val="accent1">
+                <a:lumMod val="45000"/>
+                <a:lumOff val="55000"/>
+              </a:schemeClr>
+            </a:gs>
+            <a:gs pos="83000">
+              <a:schemeClr val="accent1">
+                <a:lumMod val="45000"/>
+                <a:lumOff val="55000"/>
+              </a:schemeClr>
+            </a:gs>
+            <a:gs pos="100000">
+              <a:schemeClr val="accent1">
+                <a:lumMod val="30000"/>
+                <a:lumOff val="70000"/>
+              </a:schemeClr>
+            </a:gs>
+          </a:gsLst>
+          <a:lin ang="5400000" scaled="1"/>
+        </a:gradFill>
+        <a:effectLst/>
+      </p:bgPr>
+    </p:bg>
+    <p:spTree>
+      <p:nvGrpSpPr>
+        <p:cNvPr id="1" name=""/>
+        <p:cNvGrpSpPr/>
+        <p:nvPr/>
+      </p:nvGrpSpPr>
+      <p:grpSpPr>
+        <a:xfrm>
+          <a:off x="0" y="0"/>
+          <a:ext cx="0" cy="0"/>
+          <a:chOff x="0" y="0"/>
+          <a:chExt cx="0" cy="0"/>
+        </a:xfrm>
+      </p:grpSpPr>
+      <p:sp>
+        <p:nvSpPr>
+          <p:cNvPr id="2" name="Título 1">
+            <a:extLst>
+              <a:ext uri="{FF2B5EF4-FFF2-40B4-BE49-F238E27FC236}">
+                <a16:creationId xmlns:a16="http://schemas.microsoft.com/office/drawing/2014/main" id="{4C18766B-B762-4574-A6C0-470650F3D31C}"/>
+              </a:ext>
+            </a:extLst>
+          </p:cNvPr>
+          <p:cNvSpPr>
+            <a:spLocks noGrp="1"/>
+          </p:cNvSpPr>
+          <p:nvPr>
+            <p:ph type="title"/>
+          </p:nvPr>
+        </p:nvSpPr>
+        <p:spPr/>
+        <p:txBody>
+          <a:bodyPr/>
+          <a:lstStyle/>
+          <a:p>
+            <a:pPr algn="ctr"/>
+            <a:r>
+              <a:rPr lang="pt-BR" b="1" dirty="0"/>
+              <a:t>Desenvolvimento: A Aplicação</a:t>
+            </a:r>
+          </a:p>
+        </p:txBody>
+      </p:sp>
+      <p:sp>
+        <p:nvSpPr>
+          <p:cNvPr id="3" name="Espaço Reservado para Conteúdo 2">
+            <a:extLst>
+              <a:ext uri="{FF2B5EF4-FFF2-40B4-BE49-F238E27FC236}">
+                <a16:creationId xmlns:a16="http://schemas.microsoft.com/office/drawing/2014/main" id="{94B54B5C-F2B9-4B6D-A2B3-513375728583}"/>
+              </a:ext>
+            </a:extLst>
+          </p:cNvPr>
+          <p:cNvSpPr>
+            <a:spLocks noGrp="1"/>
+          </p:cNvSpPr>
+          <p:nvPr>
+            <p:ph idx="1"/>
+          </p:nvPr>
+        </p:nvSpPr>
+        <p:spPr>
+          <a:xfrm>
+            <a:off x="838200" y="2141537"/>
+            <a:ext cx="10515600" cy="4351338"/>
+          </a:xfrm>
+        </p:spPr>
+        <p:txBody>
+          <a:bodyPr>
+            <a:normAutofit lnSpcReduction="10000"/>
+          </a:bodyPr>
+          <a:lstStyle/>
+          <a:p>
+            <a:pPr marL="0" indent="0">
+              <a:buNone/>
+            </a:pPr>
+            <a:r>
+              <a:rPr lang="pt-BR" dirty="0" err="1"/>
+              <a:t>Frontend</a:t>
+            </a:r>
+            <a:r>
+              <a:rPr lang="pt-BR" dirty="0"/>
+              <a:t> - A Web:</a:t>
+            </a:r>
+          </a:p>
+          <a:p>
+            <a:pPr marL="0" indent="0">
+              <a:buNone/>
+            </a:pPr>
+            <a:endParaRPr lang="pt-BR" dirty="0"/>
+          </a:p>
+          <a:p>
+            <a:r>
+              <a:rPr lang="pt-BR" dirty="0" err="1"/>
+              <a:t>ReactJS</a:t>
+            </a:r>
+            <a:r>
+              <a:rPr lang="pt-BR" dirty="0"/>
+              <a:t>;</a:t>
+            </a:r>
+          </a:p>
+          <a:p>
+            <a:r>
+              <a:rPr lang="pt-BR" dirty="0"/>
+              <a:t>Bibliotecas </a:t>
+            </a:r>
+            <a:r>
+              <a:rPr lang="pt-BR" dirty="0" err="1"/>
+              <a:t>MaterialUI</a:t>
+            </a:r>
+            <a:r>
+              <a:rPr lang="pt-BR" dirty="0"/>
+              <a:t>, </a:t>
+            </a:r>
+            <a:r>
+              <a:rPr lang="pt-BR" dirty="0" err="1"/>
+              <a:t>MapGL</a:t>
+            </a:r>
+            <a:r>
+              <a:rPr lang="pt-BR" dirty="0"/>
+              <a:t>, </a:t>
+            </a:r>
+            <a:r>
+              <a:rPr lang="pt-BR" dirty="0" err="1"/>
+              <a:t>ApexCharts</a:t>
+            </a:r>
+            <a:r>
+              <a:rPr lang="pt-BR" dirty="0"/>
+              <a:t>, </a:t>
+            </a:r>
+            <a:r>
+              <a:rPr lang="pt-BR" dirty="0" err="1"/>
+              <a:t>FontAwesome</a:t>
+            </a:r>
+            <a:r>
+              <a:rPr lang="pt-BR" dirty="0"/>
+              <a:t>, </a:t>
+            </a:r>
+            <a:r>
+              <a:rPr lang="pt-BR" dirty="0" err="1"/>
+              <a:t>Rodal</a:t>
+            </a:r>
+            <a:r>
+              <a:rPr lang="pt-BR" dirty="0"/>
+              <a:t> entre outras;</a:t>
+            </a:r>
+          </a:p>
+          <a:p>
+            <a:r>
+              <a:rPr lang="pt-BR" dirty="0"/>
+              <a:t>Login com token JWT – mais segurança, menos requisições;</a:t>
+            </a:r>
+          </a:p>
+          <a:p>
+            <a:r>
+              <a:rPr lang="pt-BR" dirty="0"/>
+              <a:t>Geolocalização e mapeamento em tempo real;</a:t>
+            </a:r>
+          </a:p>
+          <a:p>
+            <a:r>
+              <a:rPr lang="pt-BR" dirty="0"/>
+              <a:t>Funções assíncronas sempre que viável;</a:t>
+            </a:r>
+          </a:p>
+          <a:p>
+            <a:r>
+              <a:rPr lang="pt-BR" dirty="0"/>
+              <a:t>Página Colaborativa – os usuários alimentam seu conteúdo.</a:t>
+            </a:r>
+          </a:p>
+        </p:txBody>
+      </p:sp>
+    </p:spTree>
+    <p:extLst>
+      <p:ext uri="{BB962C8B-B14F-4D97-AF65-F5344CB8AC3E}">
+        <p14:creationId xmlns:p14="http://schemas.microsoft.com/office/powerpoint/2010/main" val="2352215143"/>
+      </p:ext>
+    </p:extLst>
+  </p:cSld>
+  <p:clrMapOvr>
+    <a:masterClrMapping/>
+  </p:clrMapOvr>
+</p:sld>
+</file>
+
+<file path=ppt/slides/slide16.xml><?xml version="1.0" encoding="utf-8"?>
+<p:sld xmlns:a="http://schemas.openxmlformats.org/drawingml/2006/main" xmlns:r="http://schemas.openxmlformats.org/officeDocument/2006/relationships" xmlns:p="http://schemas.openxmlformats.org/presentationml/2006/main">
+  <p:cSld>
+    <p:bg>
+      <p:bgPr>
+        <a:gradFill>
+          <a:gsLst>
+            <a:gs pos="0">
+              <a:schemeClr val="accent1">
+                <a:lumMod val="5000"/>
+                <a:lumOff val="95000"/>
+              </a:schemeClr>
+            </a:gs>
+            <a:gs pos="74000">
+              <a:schemeClr val="accent1">
+                <a:lumMod val="45000"/>
+                <a:lumOff val="55000"/>
+              </a:schemeClr>
+            </a:gs>
+            <a:gs pos="83000">
+              <a:schemeClr val="accent1">
+                <a:lumMod val="45000"/>
+                <a:lumOff val="55000"/>
+              </a:schemeClr>
+            </a:gs>
+            <a:gs pos="100000">
+              <a:schemeClr val="accent1">
+                <a:lumMod val="30000"/>
+                <a:lumOff val="70000"/>
+              </a:schemeClr>
+            </a:gs>
+          </a:gsLst>
+          <a:lin ang="5400000" scaled="1"/>
+        </a:gradFill>
+        <a:effectLst/>
+      </p:bgPr>
+    </p:bg>
+    <p:spTree>
+      <p:nvGrpSpPr>
+        <p:cNvPr id="1" name=""/>
+        <p:cNvGrpSpPr/>
+        <p:nvPr/>
+      </p:nvGrpSpPr>
+      <p:grpSpPr>
+        <a:xfrm>
+          <a:off x="0" y="0"/>
+          <a:ext cx="0" cy="0"/>
+          <a:chOff x="0" y="0"/>
+          <a:chExt cx="0" cy="0"/>
+        </a:xfrm>
+      </p:grpSpPr>
+      <p:sp>
+        <p:nvSpPr>
+          <p:cNvPr id="2" name="Título 1">
+            <a:extLst>
+              <a:ext uri="{FF2B5EF4-FFF2-40B4-BE49-F238E27FC236}">
+                <a16:creationId xmlns:a16="http://schemas.microsoft.com/office/drawing/2014/main" id="{4C18766B-B762-4574-A6C0-470650F3D31C}"/>
+              </a:ext>
+            </a:extLst>
+          </p:cNvPr>
+          <p:cNvSpPr>
+            <a:spLocks noGrp="1"/>
+          </p:cNvSpPr>
+          <p:nvPr>
+            <p:ph type="title"/>
+          </p:nvPr>
+        </p:nvSpPr>
+        <p:spPr/>
+        <p:txBody>
+          <a:bodyPr/>
+          <a:lstStyle/>
+          <a:p>
+            <a:pPr algn="ctr"/>
+            <a:r>
+              <a:rPr lang="pt-BR" b="1" dirty="0"/>
+              <a:t>Desenvolvimento: A API</a:t>
+            </a:r>
+          </a:p>
+        </p:txBody>
+      </p:sp>
+      <p:sp>
+        <p:nvSpPr>
+          <p:cNvPr id="3" name="Espaço Reservado para Conteúdo 2">
+            <a:extLst>
+              <a:ext uri="{FF2B5EF4-FFF2-40B4-BE49-F238E27FC236}">
+                <a16:creationId xmlns:a16="http://schemas.microsoft.com/office/drawing/2014/main" id="{94B54B5C-F2B9-4B6D-A2B3-513375728583}"/>
+              </a:ext>
+            </a:extLst>
+          </p:cNvPr>
+          <p:cNvSpPr>
+            <a:spLocks noGrp="1"/>
+          </p:cNvSpPr>
+          <p:nvPr>
+            <p:ph idx="1"/>
+          </p:nvPr>
+        </p:nvSpPr>
+        <p:spPr>
+          <a:xfrm>
+            <a:off x="838200" y="2141537"/>
+            <a:ext cx="10515600" cy="4351338"/>
+          </a:xfrm>
+        </p:spPr>
+        <p:txBody>
+          <a:bodyPr>
+            <a:normAutofit/>
+          </a:bodyPr>
+          <a:lstStyle/>
+          <a:p>
+            <a:pPr marL="0" indent="0">
+              <a:buNone/>
+            </a:pPr>
+            <a:r>
+              <a:rPr lang="pt-BR" dirty="0" err="1"/>
+              <a:t>Backend</a:t>
+            </a:r>
+            <a:r>
+              <a:rPr lang="pt-BR" dirty="0"/>
+              <a:t> – </a:t>
+            </a:r>
+            <a:r>
+              <a:rPr lang="pt-BR" dirty="0" err="1"/>
+              <a:t>API’s</a:t>
+            </a:r>
+            <a:r>
+              <a:rPr lang="pt-BR" dirty="0"/>
+              <a:t> de comunicação:</a:t>
+            </a:r>
+          </a:p>
+          <a:p>
+            <a:pPr marL="0" indent="0">
+              <a:buNone/>
+            </a:pPr>
+            <a:endParaRPr lang="pt-BR" dirty="0"/>
+          </a:p>
+          <a:p>
+            <a:r>
+              <a:rPr lang="pt-BR" dirty="0" err="1"/>
+              <a:t>NodeJS</a:t>
+            </a:r>
+            <a:r>
+              <a:rPr lang="pt-BR" dirty="0"/>
+              <a:t>;</a:t>
+            </a:r>
+          </a:p>
+          <a:p>
+            <a:r>
+              <a:rPr lang="pt-BR" dirty="0"/>
+              <a:t>ORM </a:t>
+            </a:r>
+            <a:r>
+              <a:rPr lang="pt-BR" dirty="0" err="1"/>
+              <a:t>Lucid</a:t>
+            </a:r>
+            <a:r>
+              <a:rPr lang="pt-BR" dirty="0"/>
+              <a:t> e Framework </a:t>
+            </a:r>
+            <a:r>
+              <a:rPr lang="pt-BR" dirty="0" err="1"/>
+              <a:t>AdonisJS</a:t>
+            </a:r>
+            <a:r>
+              <a:rPr lang="pt-BR" dirty="0"/>
+              <a:t> (autenticação, roteamento, JSON Parse, </a:t>
+            </a:r>
+            <a:r>
+              <a:rPr lang="pt-BR" dirty="0" err="1"/>
+              <a:t>Body</a:t>
+            </a:r>
+            <a:r>
+              <a:rPr lang="pt-BR" dirty="0"/>
+              <a:t> Parse);</a:t>
+            </a:r>
+          </a:p>
+          <a:p>
+            <a:r>
+              <a:rPr lang="pt-BR" dirty="0"/>
+              <a:t>Bibliotecas </a:t>
+            </a:r>
+            <a:r>
+              <a:rPr lang="pt-BR" dirty="0" err="1"/>
+              <a:t>Knex</a:t>
+            </a:r>
+            <a:r>
+              <a:rPr lang="pt-BR" dirty="0"/>
+              <a:t>, PG-</a:t>
+            </a:r>
+            <a:r>
+              <a:rPr lang="pt-BR" dirty="0" err="1"/>
+              <a:t>connect</a:t>
+            </a:r>
+            <a:r>
+              <a:rPr lang="pt-BR" dirty="0"/>
+              <a:t> e </a:t>
+            </a:r>
+            <a:r>
+              <a:rPr lang="pt-BR" dirty="0" err="1"/>
+              <a:t>Mongoose</a:t>
+            </a:r>
+            <a:r>
+              <a:rPr lang="pt-BR" dirty="0"/>
+              <a:t>;</a:t>
+            </a:r>
+          </a:p>
+          <a:p>
+            <a:r>
+              <a:rPr lang="pt-BR" dirty="0"/>
+              <a:t>Middleware de autenticação para controladores de rotas específicas;</a:t>
+            </a:r>
+          </a:p>
+          <a:p>
+            <a:r>
+              <a:rPr lang="pt-BR" dirty="0"/>
+              <a:t>Funções assíncronas sempre que viável;</a:t>
+            </a:r>
+          </a:p>
+        </p:txBody>
+      </p:sp>
+    </p:spTree>
+    <p:extLst>
+      <p:ext uri="{BB962C8B-B14F-4D97-AF65-F5344CB8AC3E}">
+        <p14:creationId xmlns:p14="http://schemas.microsoft.com/office/powerpoint/2010/main" val="3153173229"/>
+      </p:ext>
+    </p:extLst>
+  </p:cSld>
+  <p:clrMapOvr>
+    <a:masterClrMapping/>
+  </p:clrMapOvr>
+</p:sld>
+</file>
+
+<file path=ppt/slides/slide17.xml><?xml version="1.0" encoding="utf-8"?>
+<p:sld xmlns:a="http://schemas.openxmlformats.org/drawingml/2006/main" xmlns:r="http://schemas.openxmlformats.org/officeDocument/2006/relationships" xmlns:p="http://schemas.openxmlformats.org/presentationml/2006/main">
+  <p:cSld>
+    <p:bg>
+      <p:bgPr>
+        <a:gradFill>
+          <a:gsLst>
+            <a:gs pos="0">
+              <a:schemeClr val="accent1">
+                <a:lumMod val="5000"/>
+                <a:lumOff val="95000"/>
+              </a:schemeClr>
+            </a:gs>
+            <a:gs pos="74000">
+              <a:schemeClr val="accent1">
+                <a:lumMod val="45000"/>
+                <a:lumOff val="55000"/>
+              </a:schemeClr>
+            </a:gs>
+            <a:gs pos="83000">
+              <a:schemeClr val="accent1">
+                <a:lumMod val="45000"/>
+                <a:lumOff val="55000"/>
+              </a:schemeClr>
+            </a:gs>
+            <a:gs pos="100000">
+              <a:schemeClr val="accent1">
+                <a:lumMod val="30000"/>
+                <a:lumOff val="70000"/>
+              </a:schemeClr>
+            </a:gs>
+          </a:gsLst>
+          <a:lin ang="5400000" scaled="1"/>
+        </a:gradFill>
+        <a:effectLst/>
+      </p:bgPr>
+    </p:bg>
+    <p:spTree>
+      <p:nvGrpSpPr>
+        <p:cNvPr id="1" name=""/>
+        <p:cNvGrpSpPr/>
+        <p:nvPr/>
+      </p:nvGrpSpPr>
+      <p:grpSpPr>
+        <a:xfrm>
+          <a:off x="0" y="0"/>
+          <a:ext cx="0" cy="0"/>
+          <a:chOff x="0" y="0"/>
+          <a:chExt cx="0" cy="0"/>
+        </a:xfrm>
+      </p:grpSpPr>
+      <p:sp>
+        <p:nvSpPr>
+          <p:cNvPr id="2" name="Título 1">
+            <a:extLst>
+              <a:ext uri="{FF2B5EF4-FFF2-40B4-BE49-F238E27FC236}">
+                <a16:creationId xmlns:a16="http://schemas.microsoft.com/office/drawing/2014/main" id="{4C18766B-B762-4574-A6C0-470650F3D31C}"/>
+              </a:ext>
+            </a:extLst>
+          </p:cNvPr>
+          <p:cNvSpPr>
+            <a:spLocks noGrp="1"/>
+          </p:cNvSpPr>
+          <p:nvPr>
+            <p:ph type="title"/>
+          </p:nvPr>
+        </p:nvSpPr>
+        <p:spPr/>
+        <p:txBody>
+          <a:bodyPr/>
+          <a:lstStyle/>
+          <a:p>
+            <a:pPr algn="ctr"/>
+            <a:r>
+              <a:rPr lang="pt-BR" b="1" dirty="0"/>
+              <a:t>O que ainda pode ser feito ?</a:t>
+            </a:r>
+          </a:p>
+        </p:txBody>
+      </p:sp>
+      <p:sp>
+        <p:nvSpPr>
+          <p:cNvPr id="3" name="Espaço Reservado para Conteúdo 2">
+            <a:extLst>
+              <a:ext uri="{FF2B5EF4-FFF2-40B4-BE49-F238E27FC236}">
+                <a16:creationId xmlns:a16="http://schemas.microsoft.com/office/drawing/2014/main" id="{94B54B5C-F2B9-4B6D-A2B3-513375728583}"/>
+              </a:ext>
+            </a:extLst>
+          </p:cNvPr>
+          <p:cNvSpPr>
+            <a:spLocks noGrp="1"/>
+          </p:cNvSpPr>
+          <p:nvPr>
+            <p:ph idx="1"/>
+          </p:nvPr>
+        </p:nvSpPr>
+        <p:spPr>
+          <a:xfrm>
+            <a:off x="838200" y="2141537"/>
+            <a:ext cx="10515600" cy="4351338"/>
+          </a:xfrm>
+        </p:spPr>
+        <p:txBody>
+          <a:bodyPr>
+            <a:normAutofit/>
+          </a:bodyPr>
+          <a:lstStyle/>
+          <a:p>
+            <a:r>
+              <a:rPr lang="pt-BR" dirty="0"/>
+              <a:t>Melhorar o algoritmo de ranqueamento de jogadores com base em avaliações individuais;</a:t>
+            </a:r>
+          </a:p>
+          <a:p>
+            <a:r>
+              <a:rPr lang="pt-BR" dirty="0"/>
+              <a:t>Desenvolver a lógica de recuperação de senha;</a:t>
+            </a:r>
+          </a:p>
+          <a:p>
+            <a:r>
+              <a:rPr lang="pt-BR" dirty="0"/>
+              <a:t>Integrar a aplicação ao Google e redes sociais para login;</a:t>
+            </a:r>
+          </a:p>
+          <a:p>
+            <a:r>
+              <a:rPr lang="pt-BR" dirty="0"/>
+              <a:t>Desenvolver o aplicativo mobile (a utilização de </a:t>
+            </a:r>
+            <a:r>
+              <a:rPr lang="pt-BR" dirty="0" err="1"/>
+              <a:t>ReactNative</a:t>
+            </a:r>
+            <a:r>
+              <a:rPr lang="pt-BR" dirty="0"/>
+              <a:t> permite a reutilização de grande parte do código!);</a:t>
+            </a:r>
+          </a:p>
+          <a:p>
+            <a:r>
+              <a:rPr lang="pt-BR" dirty="0"/>
+              <a:t>Analisar relação de custo x benefício entre o </a:t>
+            </a:r>
+            <a:r>
+              <a:rPr lang="pt-BR" dirty="0" err="1"/>
+              <a:t>MongoDB</a:t>
+            </a:r>
+            <a:r>
+              <a:rPr lang="pt-BR" dirty="0"/>
+              <a:t> e bases relacionais;</a:t>
+            </a:r>
+          </a:p>
+          <a:p>
+            <a:r>
+              <a:rPr lang="pt-BR" dirty="0"/>
+              <a:t>Analisar a integração dessas bases ao </a:t>
+            </a:r>
+            <a:r>
+              <a:rPr lang="pt-BR" dirty="0" err="1"/>
+              <a:t>Firebase</a:t>
+            </a:r>
+            <a:r>
+              <a:rPr lang="pt-BR" dirty="0"/>
+              <a:t> (</a:t>
+            </a:r>
+            <a:r>
+              <a:rPr lang="pt-BR" dirty="0" err="1"/>
+              <a:t>ReactNative</a:t>
+            </a:r>
+            <a:r>
+              <a:rPr lang="pt-BR" dirty="0"/>
+              <a:t>);</a:t>
+            </a:r>
+          </a:p>
+        </p:txBody>
+      </p:sp>
+    </p:spTree>
+    <p:extLst>
+      <p:ext uri="{BB962C8B-B14F-4D97-AF65-F5344CB8AC3E}">
+        <p14:creationId xmlns:p14="http://schemas.microsoft.com/office/powerpoint/2010/main" val="829855911"/>
+      </p:ext>
+    </p:extLst>
+  </p:cSld>
+  <p:clrMapOvr>
+    <a:masterClrMapping/>
+  </p:clrMapOvr>
+</p:sld>
+</file>
+
+<file path=ppt/slides/slide18.xml><?xml version="1.0" encoding="utf-8"?>
+<p:sld xmlns:a="http://schemas.openxmlformats.org/drawingml/2006/main" xmlns:r="http://schemas.openxmlformats.org/officeDocument/2006/relationships" xmlns:p="http://schemas.openxmlformats.org/presentationml/2006/main">
+  <p:cSld>
+    <p:bg>
+      <p:bgPr>
+        <a:blipFill dpi="0" rotWithShape="1">
+          <a:blip r:embed="rId2">
+            <a:lum/>
+          </a:blip>
+          <a:srcRect/>
+          <a:stretch>
+            <a:fillRect t="-3000" b="-3000"/>
+          </a:stretch>
+        </a:blipFill>
+        <a:effectLst/>
+      </p:bgPr>
+    </p:bg>
+    <p:spTree>
+      <p:nvGrpSpPr>
+        <p:cNvPr id="1" name=""/>
+        <p:cNvGrpSpPr/>
+        <p:nvPr/>
+      </p:nvGrpSpPr>
+      <p:grpSpPr>
+        <a:xfrm>
+          <a:off x="0" y="0"/>
+          <a:ext cx="0" cy="0"/>
+          <a:chOff x="0" y="0"/>
+          <a:chExt cx="0" cy="0"/>
+        </a:xfrm>
+      </p:grpSpPr>
+      <p:sp>
+        <p:nvSpPr>
+          <p:cNvPr id="2" name="Título 1">
+            <a:extLst>
+              <a:ext uri="{FF2B5EF4-FFF2-40B4-BE49-F238E27FC236}">
                 <a16:creationId xmlns:a16="http://schemas.microsoft.com/office/drawing/2014/main" id="{65658736-EE7B-4E36-90B9-C8DA7AC98261}"/>
               </a:ext>
             </a:extLst>
@@ -4096,15 +4768,26 @@
             <p:ph type="title"/>
           </p:nvPr>
         </p:nvSpPr>
-        <p:spPr/>
+        <p:spPr>
+          <a:xfrm>
+            <a:off x="838200" y="913765"/>
+            <a:ext cx="10515600" cy="1325563"/>
+          </a:xfrm>
+        </p:spPr>
         <p:txBody>
           <a:bodyPr/>
           <a:lstStyle/>
           <a:p>
             <a:pPr algn="ctr"/>
             <a:r>
-              <a:rPr lang="pt-BR" dirty="0"/>
-              <a:t>O que esperar a partir daqui ?</a:t>
+              <a:rPr lang="pt-BR" b="1" dirty="0">
+                <a:solidFill>
+                  <a:schemeClr val="accent2">
+                    <a:lumMod val="75000"/>
+                  </a:schemeClr>
+                </a:solidFill>
+              </a:rPr>
+              <a:t>Conclusão</a:t>
             </a:r>
           </a:p>
         </p:txBody>
@@ -4125,68 +4808,118 @@
             <p:ph idx="1"/>
           </p:nvPr>
         </p:nvSpPr>
-        <p:spPr/>
+        <p:spPr>
+          <a:xfrm>
+            <a:off x="838200" y="2782228"/>
+            <a:ext cx="10515600" cy="4351338"/>
+          </a:xfrm>
+        </p:spPr>
         <p:txBody>
           <a:bodyPr/>
           <a:lstStyle/>
           <a:p>
             <a:r>
-              <a:rPr lang="pt-BR" dirty="0"/>
-              <a:t>Que Deus me ajude </a:t>
-            </a:r>
-            <a:r>
-              <a:rPr lang="pt-BR" dirty="0">
+              <a:rPr lang="pt-BR" b="1" dirty="0">
+                <a:solidFill>
+                  <a:schemeClr val="bg1"/>
+                </a:solidFill>
                 <a:sym typeface="Wingdings" panose="05000000000000000000" pitchFamily="2" charset="2"/>
               </a:rPr>
-              <a:t></a:t>
-            </a:r>
-          </a:p>
-          <a:p>
-            <a:endParaRPr lang="pt-BR" dirty="0">
-              <a:sym typeface="Wingdings" panose="05000000000000000000" pitchFamily="2" charset="2"/>
-            </a:endParaRPr>
-          </a:p>
-          <a:p>
-            <a:endParaRPr lang="pt-BR" dirty="0">
-              <a:sym typeface="Wingdings" panose="05000000000000000000" pitchFamily="2" charset="2"/>
-            </a:endParaRPr>
-          </a:p>
-          <a:p>
-            <a:r>
-              <a:rPr lang="pt-BR" dirty="0">
+              <a:t>A </a:t>
+            </a:r>
+            <a:r>
+              <a:rPr lang="pt-BR" b="1" dirty="0" err="1">
+                <a:solidFill>
+                  <a:schemeClr val="bg1"/>
+                </a:solidFill>
                 <a:sym typeface="Wingdings" panose="05000000000000000000" pitchFamily="2" charset="2"/>
               </a:rPr>
-              <a:t>E o professor também </a:t>
-            </a:r>
-          </a:p>
-          <a:p>
-            <a:endParaRPr lang="pt-BR" dirty="0">
-              <a:sym typeface="Wingdings" panose="05000000000000000000" pitchFamily="2" charset="2"/>
-            </a:endParaRPr>
-          </a:p>
-          <a:p>
-            <a:endParaRPr lang="pt-BR" dirty="0">
-              <a:sym typeface="Wingdings" panose="05000000000000000000" pitchFamily="2" charset="2"/>
-            </a:endParaRPr>
-          </a:p>
-          <a:p>
-            <a:r>
-              <a:rPr lang="pt-BR" dirty="0">
+              <a:t>stack</a:t>
+            </a:r>
+            <a:r>
+              <a:rPr lang="pt-BR" b="1" dirty="0">
+                <a:solidFill>
+                  <a:schemeClr val="bg1"/>
+                </a:solidFill>
                 <a:sym typeface="Wingdings" panose="05000000000000000000" pitchFamily="2" charset="2"/>
               </a:rPr>
-              <a:t>E a finalização do front-</a:t>
-            </a:r>
-            <a:r>
-              <a:rPr lang="pt-BR" dirty="0" err="1">
+              <a:t> </a:t>
+            </a:r>
+            <a:r>
+              <a:rPr lang="pt-BR" b="1" dirty="0" err="1">
+                <a:solidFill>
+                  <a:schemeClr val="bg1"/>
+                </a:solidFill>
                 <a:sym typeface="Wingdings" panose="05000000000000000000" pitchFamily="2" charset="2"/>
               </a:rPr>
-              <a:t>end</a:t>
-            </a:r>
-            <a:r>
-              <a:rPr lang="pt-BR" dirty="0">
+              <a:t>Javascript</a:t>
+            </a:r>
+            <a:r>
+              <a:rPr lang="pt-BR" b="1" dirty="0">
+                <a:solidFill>
+                  <a:schemeClr val="bg1"/>
+                </a:solidFill>
                 <a:sym typeface="Wingdings" panose="05000000000000000000" pitchFamily="2" charset="2"/>
               </a:rPr>
-              <a:t> (95% concluído) e o desenvolvimento do aplicativo mobile (não iniciado).</a:t>
+              <a:t> se mostrou completa, permitindo a </a:t>
+            </a:r>
+            <a:r>
+              <a:rPr lang="pt-BR" b="1" dirty="0" err="1">
+                <a:solidFill>
+                  <a:schemeClr val="bg1"/>
+                </a:solidFill>
+                <a:sym typeface="Wingdings" panose="05000000000000000000" pitchFamily="2" charset="2"/>
+              </a:rPr>
+              <a:t>componentização</a:t>
+            </a:r>
+            <a:r>
+              <a:rPr lang="pt-BR" b="1" dirty="0">
+                <a:solidFill>
+                  <a:schemeClr val="bg1"/>
+                </a:solidFill>
+                <a:sym typeface="Wingdings" panose="05000000000000000000" pitchFamily="2" charset="2"/>
+              </a:rPr>
+              <a:t> do código e sua reutilização de maneira simples, eficaz e com segurança.</a:t>
+            </a:r>
+          </a:p>
+          <a:p>
+            <a:r>
+              <a:rPr lang="pt-BR" b="1" dirty="0">
+                <a:solidFill>
+                  <a:schemeClr val="bg1"/>
+                </a:solidFill>
+                <a:sym typeface="Wingdings" panose="05000000000000000000" pitchFamily="2" charset="2"/>
+              </a:rPr>
+              <a:t>Suas bibliotecas incríveis permitiram um desenvolvimento ágil e robusto</a:t>
+            </a:r>
+          </a:p>
+          <a:p>
+            <a:r>
+              <a:rPr lang="pt-BR" b="1" dirty="0">
+                <a:solidFill>
+                  <a:schemeClr val="bg1"/>
+                </a:solidFill>
+                <a:sym typeface="Wingdings" panose="05000000000000000000" pitchFamily="2" charset="2"/>
+              </a:rPr>
+              <a:t>Utilizar uma mesma linguagem tanto no front quanto no </a:t>
+            </a:r>
+            <a:r>
+              <a:rPr lang="pt-BR" b="1" dirty="0" err="1">
+                <a:solidFill>
+                  <a:schemeClr val="bg1"/>
+                </a:solidFill>
+                <a:sym typeface="Wingdings" panose="05000000000000000000" pitchFamily="2" charset="2"/>
+              </a:rPr>
+              <a:t>backend</a:t>
+            </a:r>
+            <a:r>
+              <a:rPr lang="pt-BR" b="1" dirty="0">
+                <a:solidFill>
+                  <a:schemeClr val="bg1"/>
+                </a:solidFill>
+                <a:sym typeface="Wingdings" panose="05000000000000000000" pitchFamily="2" charset="2"/>
+              </a:rPr>
+              <a:t> minimizou significativamente o tempo com a curva de aprendizado</a:t>
             </a:r>
           </a:p>
         </p:txBody>
@@ -4195,6 +4928,92 @@
     <p:extLst>
       <p:ext uri="{BB962C8B-B14F-4D97-AF65-F5344CB8AC3E}">
         <p14:creationId xmlns:p14="http://schemas.microsoft.com/office/powerpoint/2010/main" val="1913631474"/>
+      </p:ext>
+    </p:extLst>
+  </p:cSld>
+  <p:clrMapOvr>
+    <a:masterClrMapping/>
+  </p:clrMapOvr>
+</p:sld>
+</file>
+
+<file path=ppt/slides/slide19.xml><?xml version="1.0" encoding="utf-8"?>
+<p:sld xmlns:a="http://schemas.openxmlformats.org/drawingml/2006/main" xmlns:r="http://schemas.openxmlformats.org/officeDocument/2006/relationships" xmlns:p="http://schemas.openxmlformats.org/presentationml/2006/main">
+  <p:cSld>
+    <p:bg>
+      <p:bgPr>
+        <a:blipFill dpi="0" rotWithShape="1">
+          <a:blip r:embed="rId2">
+            <a:lum/>
+          </a:blip>
+          <a:srcRect/>
+          <a:stretch>
+            <a:fillRect l="-12000" r="-12000"/>
+          </a:stretch>
+        </a:blipFill>
+        <a:effectLst/>
+      </p:bgPr>
+    </p:bg>
+    <p:spTree>
+      <p:nvGrpSpPr>
+        <p:cNvPr id="1" name=""/>
+        <p:cNvGrpSpPr/>
+        <p:nvPr/>
+      </p:nvGrpSpPr>
+      <p:grpSpPr>
+        <a:xfrm>
+          <a:off x="0" y="0"/>
+          <a:ext cx="0" cy="0"/>
+          <a:chOff x="0" y="0"/>
+          <a:chExt cx="0" cy="0"/>
+        </a:xfrm>
+      </p:grpSpPr>
+      <p:sp>
+        <p:nvSpPr>
+          <p:cNvPr id="2" name="Título 1">
+            <a:extLst>
+              <a:ext uri="{FF2B5EF4-FFF2-40B4-BE49-F238E27FC236}">
+                <a16:creationId xmlns:a16="http://schemas.microsoft.com/office/drawing/2014/main" id="{B45F2AD3-E211-4E0E-8F11-8962887559C3}"/>
+              </a:ext>
+            </a:extLst>
+          </p:cNvPr>
+          <p:cNvSpPr>
+            <a:spLocks noGrp="1"/>
+          </p:cNvSpPr>
+          <p:nvPr>
+            <p:ph type="title"/>
+          </p:nvPr>
+        </p:nvSpPr>
+        <p:spPr>
+          <a:xfrm>
+            <a:off x="5002237" y="1654870"/>
+            <a:ext cx="3410243" cy="1325563"/>
+          </a:xfrm>
+        </p:spPr>
+        <p:txBody>
+          <a:bodyPr>
+            <a:noAutofit/>
+          </a:bodyPr>
+          <a:lstStyle/>
+          <a:p>
+            <a:r>
+              <a:rPr lang="pt-BR" sz="5000" b="1" dirty="0"/>
+              <a:t>Obrigado </a:t>
+            </a:r>
+            <a:r>
+              <a:rPr lang="pt-BR" sz="5000" b="1" dirty="0">
+                <a:sym typeface="Wingdings" panose="05000000000000000000" pitchFamily="2" charset="2"/>
+              </a:rPr>
+              <a:t></a:t>
+            </a:r>
+            <a:endParaRPr lang="pt-BR" sz="5000" b="1" dirty="0"/>
+          </a:p>
+        </p:txBody>
+      </p:sp>
+    </p:spTree>
+    <p:extLst>
+      <p:ext uri="{BB962C8B-B14F-4D97-AF65-F5344CB8AC3E}">
+        <p14:creationId xmlns:p14="http://schemas.microsoft.com/office/powerpoint/2010/main" val="2684000233"/>
       </p:ext>
     </p:extLst>
   </p:cSld>
@@ -4303,26 +5122,20 @@
         <p:spPr/>
         <p:txBody>
           <a:bodyPr>
-            <a:normAutofit lnSpcReduction="10000"/>
+            <a:normAutofit/>
           </a:bodyPr>
           <a:lstStyle/>
           <a:p>
             <a:r>
               <a:rPr lang="pt-BR" dirty="0"/>
-              <a:t>Jogos de tabuleiro envolvendo de 1 a N jogadores, organizados ou não, objetivando o cumprimento de objetivos que visam a vitória.</a:t>
-            </a:r>
-          </a:p>
-          <a:p>
-            <a:endParaRPr lang="pt-BR" dirty="0"/>
-          </a:p>
-          <a:p>
-            <a:r>
-              <a:rPr lang="pt-BR" dirty="0"/>
-              <a:t>Geralmente possuem um tabuleiro, dados e/ou peças e/ou cartas.</a:t>
-            </a:r>
-          </a:p>
-          <a:p>
-            <a:endParaRPr lang="pt-BR" dirty="0"/>
+              <a:t>Jogos interativos envolvendo de 1 a N jogadores, organizados ou não, objetivando o cumprimento de missões que visam a vitória.</a:t>
+            </a:r>
+          </a:p>
+          <a:p>
+            <a:r>
+              <a:rPr lang="pt-BR" dirty="0"/>
+              <a:t>Geralmente possuem um tabuleiro e/ou dados e/ou peças e/ou cartas.</a:t>
+            </a:r>
           </a:p>
           <a:p>
             <a:r>
@@ -4339,13 +5152,19 @@
             </a:r>
           </a:p>
           <a:p>
+            <a:r>
+              <a:rPr lang="pt-BR" dirty="0"/>
+              <a:t>Possuem incontáveis histórias reais e imaginárias, roteiros e objetivos/missões.</a:t>
+            </a:r>
+          </a:p>
+          <a:p>
+            <a:r>
+              <a:rPr lang="pt-BR" dirty="0"/>
+              <a:t>São jogados a mais de dois mil anos !</a:t>
+            </a:r>
+          </a:p>
+          <a:p>
             <a:endParaRPr lang="pt-BR" dirty="0"/>
-          </a:p>
-          <a:p>
-            <a:r>
-              <a:rPr lang="pt-BR" dirty="0"/>
-              <a:t>Possuem incontáveis histórias reais e imaginárias, roteiros e objetivos/missões.</a:t>
-            </a:r>
           </a:p>
         </p:txBody>
       </p:sp>
@@ -4494,7 +5313,15 @@
           <a:p>
             <a:r>
               <a:rPr lang="pt-BR" dirty="0"/>
-              <a:t>É um nicho de mercado aquecido e rentável: a indústria de jogos de tabuleiro movimenta mais de meio milhão de reais POR ANO.</a:t>
+              <a:t>É um nicho de mercado aquecido e rentável: a indústria de jogos de tabuleiro movimenta mais de meio </a:t>
+            </a:r>
+            <a:r>
+              <a:rPr lang="pt-BR" dirty="0" smtClean="0"/>
+              <a:t>bilhão </a:t>
+            </a:r>
+            <a:r>
+              <a:rPr lang="pt-BR" dirty="0"/>
+              <a:t>de reais POR ANO.</a:t>
             </a:r>
           </a:p>
         </p:txBody>
@@ -4670,168 +5497,6 @@
   <p:cSld>
     <p:bg>
       <p:bgPr>
-        <a:blipFill dpi="0" rotWithShape="1">
-          <a:blip r:embed="rId2">
-            <a:lum/>
-          </a:blip>
-          <a:srcRect/>
-          <a:stretch>
-            <a:fillRect t="-6000" b="-6000"/>
-          </a:stretch>
-        </a:blipFill>
-        <a:effectLst/>
-      </p:bgPr>
-    </p:bg>
-    <p:spTree>
-      <p:nvGrpSpPr>
-        <p:cNvPr id="1" name=""/>
-        <p:cNvGrpSpPr/>
-        <p:nvPr/>
-      </p:nvGrpSpPr>
-      <p:grpSpPr>
-        <a:xfrm>
-          <a:off x="0" y="0"/>
-          <a:ext cx="0" cy="0"/>
-          <a:chOff x="0" y="0"/>
-          <a:chExt cx="0" cy="0"/>
-        </a:xfrm>
-      </p:grpSpPr>
-      <p:sp>
-        <p:nvSpPr>
-          <p:cNvPr id="2" name="Título 1">
-            <a:extLst>
-              <a:ext uri="{FF2B5EF4-FFF2-40B4-BE49-F238E27FC236}">
-                <a16:creationId xmlns:a16="http://schemas.microsoft.com/office/drawing/2014/main" id="{9E40909D-C27B-4B98-86E9-EDCCB4690351}"/>
-              </a:ext>
-            </a:extLst>
-          </p:cNvPr>
-          <p:cNvSpPr>
-            <a:spLocks noGrp="1"/>
-          </p:cNvSpPr>
-          <p:nvPr>
-            <p:ph type="title"/>
-          </p:nvPr>
-        </p:nvSpPr>
-        <p:spPr/>
-        <p:txBody>
-          <a:bodyPr/>
-          <a:lstStyle/>
-          <a:p>
-            <a:pPr algn="ctr"/>
-            <a:r>
-              <a:rPr lang="pt-BR" b="1" dirty="0"/>
-              <a:t>A Banda Mestra</a:t>
-            </a:r>
-          </a:p>
-        </p:txBody>
-      </p:sp>
-      <p:sp>
-        <p:nvSpPr>
-          <p:cNvPr id="3" name="Espaço Reservado para Conteúdo 2">
-            <a:extLst>
-              <a:ext uri="{FF2B5EF4-FFF2-40B4-BE49-F238E27FC236}">
-                <a16:creationId xmlns:a16="http://schemas.microsoft.com/office/drawing/2014/main" id="{DF86BE98-7FE5-42ED-BE49-9586B0892C42}"/>
-              </a:ext>
-            </a:extLst>
-          </p:cNvPr>
-          <p:cNvSpPr>
-            <a:spLocks noGrp="1"/>
-          </p:cNvSpPr>
-          <p:nvPr>
-            <p:ph idx="1"/>
-          </p:nvPr>
-        </p:nvSpPr>
-        <p:spPr>
-          <a:xfrm>
-            <a:off x="739725" y="1690688"/>
-            <a:ext cx="10515600" cy="5033010"/>
-          </a:xfrm>
-        </p:spPr>
-        <p:txBody>
-          <a:bodyPr>
-            <a:normAutofit lnSpcReduction="10000"/>
-          </a:bodyPr>
-          <a:lstStyle/>
-          <a:p>
-            <a:r>
-              <a:rPr lang="pt-BR" dirty="0"/>
-              <a:t>Aplicativo orientado na busca de jogadores por geolocalização e de acordo com os títulos de interesse.</a:t>
-            </a:r>
-          </a:p>
-          <a:p>
-            <a:endParaRPr lang="pt-BR" b="1" dirty="0">
-              <a:solidFill>
-                <a:schemeClr val="bg1"/>
-              </a:solidFill>
-              <a:highlight>
-                <a:srgbClr val="008080"/>
-              </a:highlight>
-            </a:endParaRPr>
-          </a:p>
-          <a:p>
-            <a:r>
-              <a:rPr lang="pt-BR" dirty="0"/>
-              <a:t>Foco em segurança: o cadastro no aplicativo passa por uma checagem documental.</a:t>
-            </a:r>
-          </a:p>
-          <a:p>
-            <a:endParaRPr lang="pt-BR" b="1" dirty="0">
-              <a:solidFill>
-                <a:schemeClr val="bg1"/>
-              </a:solidFill>
-              <a:highlight>
-                <a:srgbClr val="008080"/>
-              </a:highlight>
-            </a:endParaRPr>
-          </a:p>
-          <a:p>
-            <a:r>
-              <a:rPr lang="pt-BR" dirty="0"/>
-              <a:t>Gestão de jogos: permite criar um dashboard de grupos de jogadores de acordo com o título.</a:t>
-            </a:r>
-          </a:p>
-          <a:p>
-            <a:endParaRPr lang="pt-BR" b="1" dirty="0">
-              <a:solidFill>
-                <a:schemeClr val="bg1"/>
-              </a:solidFill>
-              <a:highlight>
-                <a:srgbClr val="008080"/>
-              </a:highlight>
-            </a:endParaRPr>
-          </a:p>
-          <a:p>
-            <a:r>
-              <a:rPr lang="pt-BR" dirty="0"/>
-              <a:t>Focado na diversão: os jogadores votam a cada partida para avaliar o desempenho do grupo e de outros jogadores.</a:t>
-            </a:r>
-          </a:p>
-          <a:p>
-            <a:endParaRPr lang="pt-BR" dirty="0"/>
-          </a:p>
-          <a:p>
-            <a:endParaRPr lang="pt-BR" dirty="0"/>
-          </a:p>
-        </p:txBody>
-      </p:sp>
-    </p:spTree>
-    <p:extLst>
-      <p:ext uri="{BB962C8B-B14F-4D97-AF65-F5344CB8AC3E}">
-        <p14:creationId xmlns:p14="http://schemas.microsoft.com/office/powerpoint/2010/main" val="1298601252"/>
-      </p:ext>
-    </p:extLst>
-  </p:cSld>
-  <p:clrMapOvr>
-    <a:masterClrMapping/>
-  </p:clrMapOvr>
-</p:sld>
-</file>
-
-<file path=ppt/slides/slide6.xml><?xml version="1.0" encoding="utf-8"?>
-<p:sld xmlns:a="http://schemas.openxmlformats.org/drawingml/2006/main" xmlns:r="http://schemas.openxmlformats.org/officeDocument/2006/relationships" xmlns:p="http://schemas.openxmlformats.org/presentationml/2006/main">
-  <p:cSld>
-    <p:bg>
-      <p:bgPr>
         <a:gradFill>
           <a:gsLst>
             <a:gs pos="0">
@@ -4883,7 +5548,7 @@
           <p:cNvPr id="2" name="Título 1">
             <a:extLst>
               <a:ext uri="{FF2B5EF4-FFF2-40B4-BE49-F238E27FC236}">
-                <a16:creationId xmlns:a16="http://schemas.microsoft.com/office/drawing/2014/main" id="{4E63F17B-0CD5-46D6-9F40-46E1D529988B}"/>
+                <a16:creationId xmlns:a16="http://schemas.microsoft.com/office/drawing/2014/main" id="{43A83E8E-43C8-4211-BA1D-8C11EE4E929B}"/>
               </a:ext>
             </a:extLst>
           </p:cNvPr>
@@ -4901,123 +5566,240 @@
           <a:p>
             <a:pPr algn="ctr"/>
             <a:r>
-              <a:rPr lang="pt-BR" b="1" dirty="0"/>
-              <a:t>Banda Mestra: Foco no Simples</a:t>
-            </a:r>
-          </a:p>
-        </p:txBody>
-      </p:sp>
-      <p:sp>
-        <p:nvSpPr>
-          <p:cNvPr id="3" name="Espaço Reservado para Conteúdo 2">
-            <a:extLst>
-              <a:ext uri="{FF2B5EF4-FFF2-40B4-BE49-F238E27FC236}">
-                <a16:creationId xmlns:a16="http://schemas.microsoft.com/office/drawing/2014/main" id="{8DDCDDF5-4A21-4C0D-90F8-2D1F245881FC}"/>
-              </a:ext>
-            </a:extLst>
-          </p:cNvPr>
-          <p:cNvSpPr>
-            <a:spLocks noGrp="1"/>
-          </p:cNvSpPr>
+              <a:rPr lang="pt-BR" dirty="0"/>
+              <a:t>Sobre Dificuldades...</a:t>
+            </a:r>
+          </a:p>
+        </p:txBody>
+      </p:sp>
+      <p:pic>
+        <p:nvPicPr>
+          <p:cNvPr id="4" name="Espaço Reservado para Conteúdo 3">
+            <a:extLst>
+              <a:ext uri="{FF2B5EF4-FFF2-40B4-BE49-F238E27FC236}">
+                <a16:creationId xmlns:a16="http://schemas.microsoft.com/office/drawing/2014/main" id="{98FD5EEE-2409-4BA1-A354-2CC2DD5EBE69}"/>
+              </a:ext>
+            </a:extLst>
+          </p:cNvPr>
+          <p:cNvPicPr>
+            <a:picLocks noGrp="1" noChangeAspect="1"/>
+          </p:cNvPicPr>
           <p:nvPr>
             <p:ph idx="1"/>
           </p:nvPr>
-        </p:nvSpPr>
+        </p:nvPicPr>
+        <p:blipFill>
+          <a:blip r:embed="rId2"/>
+          <a:stretch>
+            <a:fillRect/>
+          </a:stretch>
+        </p:blipFill>
         <p:spPr>
-          <a:noFill/>
+          <a:xfrm>
+            <a:off x="482074" y="1690688"/>
+            <a:ext cx="6861262" cy="4018489"/>
+          </a:xfrm>
+          <a:prstGeom prst="rect">
+            <a:avLst/>
+          </a:prstGeom>
         </p:spPr>
-        <p:txBody>
-          <a:bodyPr>
-            <a:normAutofit fontScale="92500" lnSpcReduction="10000"/>
-          </a:bodyPr>
-          <a:lstStyle/>
-          <a:p>
-            <a:r>
-              <a:rPr lang="pt-BR" dirty="0"/>
-              <a:t>Desenvolvimento orientado a eventos utilizando as melhores práticas de programação.</a:t>
-            </a:r>
-          </a:p>
-          <a:p>
-            <a:endParaRPr lang="pt-BR" dirty="0"/>
-          </a:p>
-          <a:p>
-            <a:r>
-              <a:rPr lang="pt-BR" dirty="0"/>
-              <a:t>Reutilização de código de verdade: </a:t>
-            </a:r>
-            <a:r>
-              <a:rPr lang="pt-BR" dirty="0" err="1"/>
-              <a:t>Javascript</a:t>
-            </a:r>
-            <a:r>
-              <a:rPr lang="pt-BR" dirty="0"/>
-              <a:t> do </a:t>
-            </a:r>
-            <a:r>
-              <a:rPr lang="pt-BR" dirty="0" err="1"/>
-              <a:t>frontend</a:t>
-            </a:r>
-            <a:r>
-              <a:rPr lang="pt-BR" dirty="0"/>
-              <a:t> ao </a:t>
-            </a:r>
-            <a:r>
-              <a:rPr lang="pt-BR" dirty="0" err="1"/>
-              <a:t>backend</a:t>
-            </a:r>
-            <a:r>
-              <a:rPr lang="pt-BR" dirty="0"/>
-              <a:t> nas plataformas </a:t>
-            </a:r>
-            <a:r>
-              <a:rPr lang="pt-BR" dirty="0" err="1"/>
-              <a:t>ReactJS</a:t>
-            </a:r>
-            <a:r>
-              <a:rPr lang="pt-BR" dirty="0"/>
-              <a:t> e </a:t>
-            </a:r>
-            <a:r>
-              <a:rPr lang="pt-BR" dirty="0" err="1"/>
-              <a:t>NodeJS</a:t>
-            </a:r>
-            <a:r>
-              <a:rPr lang="pt-BR" dirty="0"/>
-              <a:t>.</a:t>
-            </a:r>
-          </a:p>
-          <a:p>
-            <a:endParaRPr lang="pt-BR" dirty="0"/>
-          </a:p>
-          <a:p>
-            <a:r>
-              <a:rPr lang="pt-BR" dirty="0"/>
-              <a:t>Baixa curva de aprendizagem e um framework poderosíssimo (</a:t>
-            </a:r>
-            <a:r>
-              <a:rPr lang="pt-BR" dirty="0" err="1"/>
-              <a:t>AdonisJS</a:t>
-            </a:r>
-            <a:r>
-              <a:rPr lang="pt-BR" dirty="0"/>
-              <a:t>)</a:t>
-            </a:r>
-          </a:p>
-          <a:p>
-            <a:endParaRPr lang="pt-BR" dirty="0"/>
-          </a:p>
-          <a:p>
-            <a:r>
-              <a:rPr lang="pt-BR" dirty="0"/>
-              <a:t>Utilização de bibliotecas performáticas utilizadas e mantidas por grandes empresas como Uber e Facebook.</a:t>
-            </a:r>
-          </a:p>
-        </p:txBody>
-      </p:sp>
+      </p:pic>
+      <p:pic>
+        <p:nvPicPr>
+          <p:cNvPr id="5" name="Imagem 4">
+            <a:extLst>
+              <a:ext uri="{FF2B5EF4-FFF2-40B4-BE49-F238E27FC236}">
+                <a16:creationId xmlns:a16="http://schemas.microsoft.com/office/drawing/2014/main" id="{A378656F-5624-40EC-99D3-9D5324A872CD}"/>
+              </a:ext>
+            </a:extLst>
+          </p:cNvPr>
+          <p:cNvPicPr>
+            <a:picLocks noChangeAspect="1"/>
+          </p:cNvPicPr>
+          <p:nvPr/>
+        </p:nvPicPr>
+        <p:blipFill>
+          <a:blip r:embed="rId3"/>
+          <a:stretch>
+            <a:fillRect/>
+          </a:stretch>
+        </p:blipFill>
+        <p:spPr>
+          <a:xfrm>
+            <a:off x="5437236" y="2902372"/>
+            <a:ext cx="6272690" cy="3695340"/>
+          </a:xfrm>
+          <a:prstGeom prst="rect">
+            <a:avLst/>
+          </a:prstGeom>
+        </p:spPr>
+      </p:pic>
     </p:spTree>
     <p:extLst>
       <p:ext uri="{BB962C8B-B14F-4D97-AF65-F5344CB8AC3E}">
-        <p14:creationId xmlns:p14="http://schemas.microsoft.com/office/powerpoint/2010/main" val="4122867020"/>
+        <p14:creationId xmlns:p14="http://schemas.microsoft.com/office/powerpoint/2010/main" val="3094524650"/>
+      </p:ext>
+    </p:extLst>
+  </p:cSld>
+  <p:clrMapOvr>
+    <a:masterClrMapping/>
+  </p:clrMapOvr>
+</p:sld>
+</file>
+
+<file path=ppt/slides/slide6.xml><?xml version="1.0" encoding="utf-8"?>
+<p:sld xmlns:a="http://schemas.openxmlformats.org/drawingml/2006/main" xmlns:r="http://schemas.openxmlformats.org/officeDocument/2006/relationships" xmlns:p="http://schemas.openxmlformats.org/presentationml/2006/main">
+  <p:cSld>
+    <p:bg>
+      <p:bgPr>
+        <a:blipFill dpi="0" rotWithShape="1">
+          <a:blip r:embed="rId2">
+            <a:lum/>
+          </a:blip>
+          <a:srcRect/>
+          <a:stretch>
+            <a:fillRect t="-6000" b="-6000"/>
+          </a:stretch>
+        </a:blipFill>
+        <a:effectLst/>
+      </p:bgPr>
+    </p:bg>
+    <p:spTree>
+      <p:nvGrpSpPr>
+        <p:cNvPr id="1" name=""/>
+        <p:cNvGrpSpPr/>
+        <p:nvPr/>
+      </p:nvGrpSpPr>
+      <p:grpSpPr>
+        <a:xfrm>
+          <a:off x="0" y="0"/>
+          <a:ext cx="0" cy="0"/>
+          <a:chOff x="0" y="0"/>
+          <a:chExt cx="0" cy="0"/>
+        </a:xfrm>
+      </p:grpSpPr>
+      <p:sp>
+        <p:nvSpPr>
+          <p:cNvPr id="2" name="Título 1">
+            <a:extLst>
+              <a:ext uri="{FF2B5EF4-FFF2-40B4-BE49-F238E27FC236}">
+                <a16:creationId xmlns:a16="http://schemas.microsoft.com/office/drawing/2014/main" id="{9E40909D-C27B-4B98-86E9-EDCCB4690351}"/>
+              </a:ext>
+            </a:extLst>
+          </p:cNvPr>
+          <p:cNvSpPr>
+            <a:spLocks noGrp="1"/>
+          </p:cNvSpPr>
+          <p:nvPr>
+            <p:ph type="title"/>
+          </p:nvPr>
+        </p:nvSpPr>
+        <p:spPr/>
+        <p:txBody>
+          <a:bodyPr/>
+          <a:lstStyle/>
+          <a:p>
+            <a:pPr algn="ctr"/>
+            <a:r>
+              <a:rPr lang="pt-BR" b="1" dirty="0"/>
+              <a:t>A Banda Mestra</a:t>
+            </a:r>
+          </a:p>
+        </p:txBody>
+      </p:sp>
+      <p:sp>
+        <p:nvSpPr>
+          <p:cNvPr id="3" name="Espaço Reservado para Conteúdo 2">
+            <a:extLst>
+              <a:ext uri="{FF2B5EF4-FFF2-40B4-BE49-F238E27FC236}">
+                <a16:creationId xmlns:a16="http://schemas.microsoft.com/office/drawing/2014/main" id="{DF86BE98-7FE5-42ED-BE49-9586B0892C42}"/>
+              </a:ext>
+            </a:extLst>
+          </p:cNvPr>
+          <p:cNvSpPr>
+            <a:spLocks noGrp="1"/>
+          </p:cNvSpPr>
+          <p:nvPr>
+            <p:ph idx="1"/>
+          </p:nvPr>
+        </p:nvSpPr>
+        <p:spPr>
+          <a:xfrm>
+            <a:off x="739725" y="1690688"/>
+            <a:ext cx="10515600" cy="5033010"/>
+          </a:xfrm>
+        </p:spPr>
+        <p:txBody>
+          <a:bodyPr>
+            <a:normAutofit lnSpcReduction="10000"/>
+          </a:bodyPr>
+          <a:lstStyle/>
+          <a:p>
+            <a:r>
+              <a:rPr lang="pt-BR" dirty="0"/>
+              <a:t>Aplicativo orientado na busca de jogadores por geolocalização e de acordo com os títulos de interesse.</a:t>
+            </a:r>
+          </a:p>
+          <a:p>
+            <a:endParaRPr lang="pt-BR" b="1" dirty="0">
+              <a:solidFill>
+                <a:schemeClr val="bg1"/>
+              </a:solidFill>
+              <a:highlight>
+                <a:srgbClr val="008080"/>
+              </a:highlight>
+            </a:endParaRPr>
+          </a:p>
+          <a:p>
+            <a:r>
+              <a:rPr lang="pt-BR" dirty="0"/>
+              <a:t>Foco em segurança: o cadastro no aplicativo passa por uma checagem documental.</a:t>
+            </a:r>
+          </a:p>
+          <a:p>
+            <a:endParaRPr lang="pt-BR" b="1" dirty="0">
+              <a:solidFill>
+                <a:schemeClr val="bg1"/>
+              </a:solidFill>
+              <a:highlight>
+                <a:srgbClr val="008080"/>
+              </a:highlight>
+            </a:endParaRPr>
+          </a:p>
+          <a:p>
+            <a:r>
+              <a:rPr lang="pt-BR" dirty="0"/>
+              <a:t>Gestão de jogos: permite criar um dashboard de grupos de jogadores de acordo com o título.</a:t>
+            </a:r>
+          </a:p>
+          <a:p>
+            <a:endParaRPr lang="pt-BR" b="1" dirty="0">
+              <a:solidFill>
+                <a:schemeClr val="bg1"/>
+              </a:solidFill>
+              <a:highlight>
+                <a:srgbClr val="008080"/>
+              </a:highlight>
+            </a:endParaRPr>
+          </a:p>
+          <a:p>
+            <a:r>
+              <a:rPr lang="pt-BR" dirty="0"/>
+              <a:t>Focado na diversão: os jogadores votam a cada partida para avaliar o desempenho do grupo e de outros jogadores.</a:t>
+            </a:r>
+          </a:p>
+          <a:p>
+            <a:endParaRPr lang="pt-BR" dirty="0"/>
+          </a:p>
+          <a:p>
+            <a:endParaRPr lang="pt-BR" dirty="0"/>
+          </a:p>
+        </p:txBody>
+      </p:sp>
+    </p:spTree>
+    <p:extLst>
+      <p:ext uri="{BB962C8B-B14F-4D97-AF65-F5344CB8AC3E}">
+        <p14:creationId xmlns:p14="http://schemas.microsoft.com/office/powerpoint/2010/main" val="1298601252"/>
       </p:ext>
     </p:extLst>
   </p:cSld>
@@ -5083,7 +5865,7 @@
           <p:cNvPr id="2" name="Título 1">
             <a:extLst>
               <a:ext uri="{FF2B5EF4-FFF2-40B4-BE49-F238E27FC236}">
-                <a16:creationId xmlns:a16="http://schemas.microsoft.com/office/drawing/2014/main" id="{EA13DCCE-50FE-4694-A2F9-CE8C3CBD502B}"/>
+                <a16:creationId xmlns:a16="http://schemas.microsoft.com/office/drawing/2014/main" id="{4E63F17B-0CD5-46D6-9F40-46E1D529988B}"/>
               </a:ext>
             </a:extLst>
           </p:cNvPr>
@@ -5102,7 +5884,7 @@
             <a:pPr algn="ctr"/>
             <a:r>
               <a:rPr lang="pt-BR" b="1" dirty="0"/>
-              <a:t>Banda Mestra – Pilares de Desenvolvimento</a:t>
+              <a:t>Foco no Simples</a:t>
             </a:r>
           </a:p>
         </p:txBody>
@@ -5112,7 +5894,7 @@
           <p:cNvPr id="3" name="Espaço Reservado para Conteúdo 2">
             <a:extLst>
               <a:ext uri="{FF2B5EF4-FFF2-40B4-BE49-F238E27FC236}">
-                <a16:creationId xmlns:a16="http://schemas.microsoft.com/office/drawing/2014/main" id="{C7236710-FBD9-45BB-80A9-9D95939D2FAE}"/>
+                <a16:creationId xmlns:a16="http://schemas.microsoft.com/office/drawing/2014/main" id="{8DDCDDF5-4A21-4C0D-90F8-2D1F245881FC}"/>
               </a:ext>
             </a:extLst>
           </p:cNvPr>
@@ -5123,16 +5905,27 @@
             <p:ph idx="1"/>
           </p:nvPr>
         </p:nvSpPr>
-        <p:spPr/>
+        <p:spPr>
+          <a:noFill/>
+        </p:spPr>
         <p:txBody>
           <a:bodyPr>
-            <a:normAutofit lnSpcReduction="10000"/>
+            <a:normAutofit fontScale="92500" lnSpcReduction="10000"/>
           </a:bodyPr>
           <a:lstStyle/>
           <a:p>
             <a:r>
               <a:rPr lang="pt-BR" dirty="0"/>
-              <a:t>Praticidade – Uso do </a:t>
+              <a:t>Desenvolvimento simples e performático utilizando as melhores práticas de programação e tecnologias.</a:t>
+            </a:r>
+          </a:p>
+          <a:p>
+            <a:endParaRPr lang="pt-BR" dirty="0"/>
+          </a:p>
+          <a:p>
+            <a:r>
+              <a:rPr lang="pt-BR" dirty="0"/>
+              <a:t>Reutilização de código (de verdade): </a:t>
             </a:r>
             <a:r>
               <a:rPr lang="pt-BR" dirty="0" err="1"/>
@@ -5140,7 +5933,39 @@
             </a:r>
             <a:r>
               <a:rPr lang="pt-BR" dirty="0"/>
-              <a:t> da web até a API.</a:t>
+              <a:t> do </a:t>
+            </a:r>
+            <a:r>
+              <a:rPr lang="pt-BR" dirty="0" err="1"/>
+              <a:t>frontend</a:t>
+            </a:r>
+            <a:r>
+              <a:rPr lang="pt-BR" dirty="0"/>
+              <a:t> ao </a:t>
+            </a:r>
+            <a:r>
+              <a:rPr lang="pt-BR" dirty="0" err="1"/>
+              <a:t>backend</a:t>
+            </a:r>
+            <a:r>
+              <a:rPr lang="pt-BR" dirty="0"/>
+              <a:t> nas plataformas </a:t>
+            </a:r>
+            <a:r>
+              <a:rPr lang="pt-BR" dirty="0" err="1"/>
+              <a:t>ReactJS</a:t>
+            </a:r>
+            <a:r>
+              <a:rPr lang="pt-BR" dirty="0"/>
+              <a:t> e API em </a:t>
+            </a:r>
+            <a:r>
+              <a:rPr lang="pt-BR" dirty="0" err="1"/>
+              <a:t>NodeJS</a:t>
+            </a:r>
+            <a:r>
+              <a:rPr lang="pt-BR" dirty="0"/>
+              <a:t>.</a:t>
             </a:r>
           </a:p>
           <a:p>
@@ -5149,7 +5974,15 @@
           <a:p>
             <a:r>
               <a:rPr lang="pt-BR" dirty="0"/>
-              <a:t>Segurança – Sistema de autenticação efetivo e com baixo envio de requisições (uso de JWT). Sistema de restrição de convites.</a:t>
+              <a:t>Baixa curva de aprendizagem e um framework poderosíssimo (</a:t>
+            </a:r>
+            <a:r>
+              <a:rPr lang="pt-BR" dirty="0" err="1"/>
+              <a:t>AdonisJS</a:t>
+            </a:r>
+            <a:r>
+              <a:rPr lang="pt-BR" dirty="0"/>
+              <a:t>)</a:t>
             </a:r>
           </a:p>
           <a:p>
@@ -5158,16 +5991,7 @@
           <a:p>
             <a:r>
               <a:rPr lang="pt-BR" dirty="0"/>
-              <a:t>Organização – Área de criação e gestão de eventos com histórico de eventos jogados e suas avaliações.</a:t>
-            </a:r>
-          </a:p>
-          <a:p>
-            <a:endParaRPr lang="pt-BR" dirty="0"/>
-          </a:p>
-          <a:p>
-            <a:r>
-              <a:rPr lang="pt-BR" dirty="0"/>
-              <a:t>Objetividade – Encontre eventos e jogadores com base em sua localização e títulos de interesse mútuo.</a:t>
+              <a:t>Utilização de bibliotecas performáticas utilizadas e mantidas por grandes empresas como Uber e Facebook.</a:t>
             </a:r>
           </a:p>
         </p:txBody>
@@ -5175,7 +5999,7 @@
     </p:spTree>
     <p:extLst>
       <p:ext uri="{BB962C8B-B14F-4D97-AF65-F5344CB8AC3E}">
-        <p14:creationId xmlns:p14="http://schemas.microsoft.com/office/powerpoint/2010/main" val="2790817834"/>
+        <p14:creationId xmlns:p14="http://schemas.microsoft.com/office/powerpoint/2010/main" val="4122867020"/>
       </p:ext>
     </p:extLst>
   </p:cSld>
@@ -5260,7 +6084,7 @@
             <a:pPr algn="ctr"/>
             <a:r>
               <a:rPr lang="pt-BR" b="1" dirty="0"/>
-              <a:t>Banda Mestra - Inspirações</a:t>
+              <a:t>Pilares de Desenvolvimento</a:t>
             </a:r>
           </a:p>
         </p:txBody>
@@ -5284,97 +6108,60 @@
         <p:spPr/>
         <p:txBody>
           <a:bodyPr>
-            <a:normAutofit/>
+            <a:normAutofit lnSpcReduction="10000"/>
           </a:bodyPr>
           <a:lstStyle/>
           <a:p>
-            <a:pPr marL="0" indent="0">
-              <a:buNone/>
-            </a:pPr>
             <a:r>
               <a:rPr lang="pt-BR" dirty="0" err="1"/>
-              <a:t>Appito</a:t>
-            </a:r>
-            <a:r>
-              <a:rPr lang="pt-BR" dirty="0"/>
-              <a:t> – Aplicativo de jogos de futebol (gestão de eventos)</a:t>
-            </a:r>
-          </a:p>
-          <a:p>
-            <a:pPr marL="0" indent="0">
-              <a:buNone/>
-            </a:pPr>
+              <a:t>Componentização</a:t>
+            </a:r>
+            <a:r>
+              <a:rPr lang="pt-BR" dirty="0"/>
+              <a:t> – Uso da </a:t>
+            </a:r>
+            <a:r>
+              <a:rPr lang="pt-BR" dirty="0" err="1"/>
+              <a:t>stack</a:t>
+            </a:r>
+            <a:r>
+              <a:rPr lang="pt-BR" dirty="0"/>
+              <a:t> </a:t>
+            </a:r>
+            <a:r>
+              <a:rPr lang="pt-BR" dirty="0" err="1"/>
+              <a:t>Javascript</a:t>
+            </a:r>
+            <a:r>
+              <a:rPr lang="pt-BR" dirty="0"/>
+              <a:t> de ponta a ponta.</a:t>
+            </a:r>
+          </a:p>
+          <a:p>
             <a:endParaRPr lang="pt-BR" dirty="0"/>
           </a:p>
           <a:p>
-            <a:pPr marL="0" indent="0">
-              <a:buNone/>
-            </a:pPr>
-            <a:r>
-              <a:rPr lang="pt-BR" dirty="0" err="1"/>
-              <a:t>Happn</a:t>
-            </a:r>
-            <a:r>
-              <a:rPr lang="pt-BR" dirty="0"/>
-              <a:t> – Aplicativo de relacionamentos (geolocalização)</a:t>
-            </a:r>
-          </a:p>
-          <a:p>
-            <a:pPr marL="0" indent="0">
-              <a:buNone/>
-            </a:pPr>
+            <a:r>
+              <a:rPr lang="pt-BR" dirty="0"/>
+              <a:t>Segurança – Sistema de autenticação efetivo e com baixo envio de requisições (uso de JWT). Sistema de restrição de convites.</a:t>
+            </a:r>
+          </a:p>
+          <a:p>
             <a:endParaRPr lang="pt-BR" dirty="0"/>
           </a:p>
           <a:p>
-            <a:pPr marL="0" indent="0">
-              <a:buNone/>
-            </a:pPr>
-            <a:r>
-              <a:rPr lang="pt-BR" dirty="0"/>
-              <a:t>Uber – Aplicativo de transportes (sistema de avaliação)</a:t>
-            </a:r>
-          </a:p>
-          <a:p>
-            <a:pPr marL="0" indent="0">
-              <a:buNone/>
-            </a:pPr>
+            <a:r>
+              <a:rPr lang="pt-BR" dirty="0"/>
+              <a:t>Praticidade – Área de criação e gestão de eventos com histórico de eventos jogados e suas avaliações.</a:t>
+            </a:r>
+          </a:p>
+          <a:p>
             <a:endParaRPr lang="pt-BR" dirty="0"/>
           </a:p>
           <a:p>
-            <a:pPr marL="0" indent="0">
-              <a:buNone/>
-            </a:pPr>
-            <a:r>
-              <a:rPr lang="pt-BR" dirty="0" err="1"/>
-              <a:t>Mansions</a:t>
-            </a:r>
-            <a:r>
-              <a:rPr lang="pt-BR" dirty="0"/>
-              <a:t> </a:t>
-            </a:r>
-            <a:r>
-              <a:rPr lang="pt-BR" dirty="0" err="1"/>
-              <a:t>of</a:t>
-            </a:r>
-            <a:r>
-              <a:rPr lang="pt-BR" dirty="0"/>
-              <a:t> </a:t>
-            </a:r>
-            <a:r>
-              <a:rPr lang="pt-BR" dirty="0" err="1"/>
-              <a:t>Madness</a:t>
-            </a:r>
-            <a:r>
-              <a:rPr lang="pt-BR" dirty="0"/>
-              <a:t> – </a:t>
-            </a:r>
-            <a:r>
-              <a:rPr lang="pt-BR" dirty="0" err="1"/>
-              <a:t>Boardgame</a:t>
-            </a:r>
-            <a:r>
-              <a:rPr lang="pt-BR" dirty="0"/>
-              <a:t> (jogo de mesa orientado por aplicativo)</a:t>
+            <a:r>
+              <a:rPr lang="pt-BR" dirty="0"/>
+              <a:t>Objetividade – Encontre eventos e jogadores com base em sua localização e títulos de interesse mútuo.</a:t>
             </a:r>
           </a:p>
         </p:txBody>
@@ -5382,7 +6169,7 @@
     </p:spTree>
     <p:extLst>
       <p:ext uri="{BB962C8B-B14F-4D97-AF65-F5344CB8AC3E}">
-        <p14:creationId xmlns:p14="http://schemas.microsoft.com/office/powerpoint/2010/main" val="304396748"/>
+        <p14:creationId xmlns:p14="http://schemas.microsoft.com/office/powerpoint/2010/main" val="2790817834"/>
       </p:ext>
     </p:extLst>
   </p:cSld>
@@ -5448,7 +6235,7 @@
           <p:cNvPr id="2" name="Título 1">
             <a:extLst>
               <a:ext uri="{FF2B5EF4-FFF2-40B4-BE49-F238E27FC236}">
-                <a16:creationId xmlns:a16="http://schemas.microsoft.com/office/drawing/2014/main" id="{1DFB1709-06AC-43E1-AC4A-E6FCA1645AF3}"/>
+                <a16:creationId xmlns:a16="http://schemas.microsoft.com/office/drawing/2014/main" id="{EA13DCCE-50FE-4694-A2F9-CE8C3CBD502B}"/>
               </a:ext>
             </a:extLst>
           </p:cNvPr>
@@ -5467,58 +6254,129 @@
             <a:pPr algn="ctr"/>
             <a:r>
               <a:rPr lang="pt-BR" b="1" dirty="0"/>
-              <a:t>Fluxograma – </a:t>
-            </a:r>
-            <a:r>
-              <a:rPr lang="pt-BR" b="1" dirty="0" err="1"/>
-              <a:t>Javascript</a:t>
-            </a:r>
-            <a:r>
-              <a:rPr lang="pt-BR" b="1" dirty="0"/>
-              <a:t> do Começo ao Fim</a:t>
-            </a:r>
-          </a:p>
-        </p:txBody>
-      </p:sp>
-      <p:pic>
-        <p:nvPicPr>
-          <p:cNvPr id="11" name="Espaço Reservado para Conteúdo 10">
-            <a:extLst>
-              <a:ext uri="{FF2B5EF4-FFF2-40B4-BE49-F238E27FC236}">
-                <a16:creationId xmlns:a16="http://schemas.microsoft.com/office/drawing/2014/main" id="{57E10085-B4E6-4FE4-8EBE-3A2073243580}"/>
-              </a:ext>
-            </a:extLst>
-          </p:cNvPr>
-          <p:cNvPicPr>
-            <a:picLocks noGrp="1" noChangeAspect="1"/>
-          </p:cNvPicPr>
+              <a:t>Inspirações para o Projeto</a:t>
+            </a:r>
+          </a:p>
+        </p:txBody>
+      </p:sp>
+      <p:sp>
+        <p:nvSpPr>
+          <p:cNvPr id="3" name="Espaço Reservado para Conteúdo 2">
+            <a:extLst>
+              <a:ext uri="{FF2B5EF4-FFF2-40B4-BE49-F238E27FC236}">
+                <a16:creationId xmlns:a16="http://schemas.microsoft.com/office/drawing/2014/main" id="{C7236710-FBD9-45BB-80A9-9D95939D2FAE}"/>
+              </a:ext>
+            </a:extLst>
+          </p:cNvPr>
+          <p:cNvSpPr>
+            <a:spLocks noGrp="1"/>
+          </p:cNvSpPr>
           <p:nvPr>
             <p:ph idx="1"/>
           </p:nvPr>
-        </p:nvPicPr>
-        <p:blipFill>
-          <a:blip r:embed="rId2">
-            <a:extLst>
-              <a:ext uri="{28A0092B-C50C-407E-A947-70E740481C1C}">
-                <a14:useLocalDpi xmlns:a14="http://schemas.microsoft.com/office/drawing/2010/main" val="0"/>
-              </a:ext>
-            </a:extLst>
-          </a:blip>
-          <a:stretch>
-            <a:fillRect/>
-          </a:stretch>
-        </p:blipFill>
-        <p:spPr>
-          <a:xfrm>
-            <a:off x="1487432" y="1873568"/>
-            <a:ext cx="9217136" cy="4189607"/>
-          </a:xfrm>
-        </p:spPr>
-      </p:pic>
+        </p:nvSpPr>
+        <p:spPr/>
+        <p:txBody>
+          <a:bodyPr>
+            <a:normAutofit/>
+          </a:bodyPr>
+          <a:lstStyle/>
+          <a:p>
+            <a:pPr marL="0" indent="0">
+              <a:buNone/>
+            </a:pPr>
+            <a:r>
+              <a:rPr lang="pt-BR" dirty="0" err="1"/>
+              <a:t>Appito</a:t>
+            </a:r>
+            <a:r>
+              <a:rPr lang="pt-BR" dirty="0"/>
+              <a:t> – Aplicativo de jogos de futebol (gestão de eventos)</a:t>
+            </a:r>
+          </a:p>
+          <a:p>
+            <a:pPr marL="0" indent="0">
+              <a:buNone/>
+            </a:pPr>
+            <a:endParaRPr lang="pt-BR" dirty="0"/>
+          </a:p>
+          <a:p>
+            <a:pPr marL="0" indent="0">
+              <a:buNone/>
+            </a:pPr>
+            <a:r>
+              <a:rPr lang="pt-BR" dirty="0" err="1"/>
+              <a:t>Happn</a:t>
+            </a:r>
+            <a:r>
+              <a:rPr lang="pt-BR" dirty="0"/>
+              <a:t> – Aplicativo de relacionamentos (geolocalização)</a:t>
+            </a:r>
+          </a:p>
+          <a:p>
+            <a:pPr marL="0" indent="0">
+              <a:buNone/>
+            </a:pPr>
+            <a:endParaRPr lang="pt-BR" dirty="0"/>
+          </a:p>
+          <a:p>
+            <a:pPr marL="0" indent="0">
+              <a:buNone/>
+            </a:pPr>
+            <a:r>
+              <a:rPr lang="pt-BR" dirty="0"/>
+              <a:t>Uber – Aplicativo de transportes (sistema de avaliação)</a:t>
+            </a:r>
+          </a:p>
+          <a:p>
+            <a:pPr marL="0" indent="0">
+              <a:buNone/>
+            </a:pPr>
+            <a:endParaRPr lang="pt-BR" dirty="0"/>
+          </a:p>
+          <a:p>
+            <a:pPr marL="0" indent="0">
+              <a:buNone/>
+            </a:pPr>
+            <a:r>
+              <a:rPr lang="pt-BR" dirty="0" err="1"/>
+              <a:t>Mansions</a:t>
+            </a:r>
+            <a:r>
+              <a:rPr lang="pt-BR" dirty="0"/>
+              <a:t> </a:t>
+            </a:r>
+            <a:r>
+              <a:rPr lang="pt-BR" dirty="0" err="1"/>
+              <a:t>of</a:t>
+            </a:r>
+            <a:r>
+              <a:rPr lang="pt-BR" dirty="0"/>
+              <a:t> </a:t>
+            </a:r>
+            <a:r>
+              <a:rPr lang="pt-BR" dirty="0" err="1"/>
+              <a:t>Madness</a:t>
+            </a:r>
+            <a:r>
+              <a:rPr lang="pt-BR" dirty="0"/>
+              <a:t> – </a:t>
+            </a:r>
+            <a:r>
+              <a:rPr lang="pt-BR" dirty="0" err="1"/>
+              <a:t>Boardgame</a:t>
+            </a:r>
+            <a:r>
+              <a:rPr lang="pt-BR" dirty="0"/>
+              <a:t> (jogo de mesa orientado por aplicativo)</a:t>
+            </a:r>
+          </a:p>
+        </p:txBody>
+      </p:sp>
     </p:spTree>
     <p:extLst>
       <p:ext uri="{BB962C8B-B14F-4D97-AF65-F5344CB8AC3E}">
-        <p14:creationId xmlns:p14="http://schemas.microsoft.com/office/powerpoint/2010/main" val="1646816897"/>
+        <p14:creationId xmlns:p14="http://schemas.microsoft.com/office/powerpoint/2010/main" val="304396748"/>
       </p:ext>
     </p:extLst>
   </p:cSld>

</xml_diff>